<commit_message>
quick tweak before show
</commit_message>
<xml_diff>
--- a/jimmysch-ironruby.pptx
+++ b/jimmysch-ironruby.pptx
@@ -7621,7 +7621,7 @@
 </file>
 
 <file path=ppt/slides/slide14.xml><?xml version="1.0" encoding="utf-8"?>
-<p:sld xmlns:a="http://schemas.openxmlformats.org/drawingml/2006/main" xmlns:r="http://schemas.openxmlformats.org/officeDocument/2006/relationships" xmlns:p="http://schemas.openxmlformats.org/presentationml/2006/main" show="0">
+<p:sld xmlns:a="http://schemas.openxmlformats.org/drawingml/2006/main" xmlns:r="http://schemas.openxmlformats.org/officeDocument/2006/relationships" xmlns:p="http://schemas.openxmlformats.org/presentationml/2006/main">
   <p:cSld>
     <p:spTree>
       <p:nvGrpSpPr>
@@ -7730,7 +7730,7 @@
 </file>
 
 <file path=ppt/slides/slide15.xml><?xml version="1.0" encoding="utf-8"?>
-<p:sld xmlns:a="http://schemas.openxmlformats.org/drawingml/2006/main" xmlns:r="http://schemas.openxmlformats.org/officeDocument/2006/relationships" xmlns:p="http://schemas.openxmlformats.org/presentationml/2006/main" show="0">
+<p:sld xmlns:a="http://schemas.openxmlformats.org/drawingml/2006/main" xmlns:r="http://schemas.openxmlformats.org/officeDocument/2006/relationships" xmlns:p="http://schemas.openxmlformats.org/presentationml/2006/main">
   <p:cSld>
     <p:spTree>
       <p:nvGrpSpPr>

</xml_diff>

<commit_message>
... and can't forget the powerpoint
</commit_message>
<xml_diff>
--- a/jimmysch-ironruby.pptx
+++ b/jimmysch-ironruby.pptx
@@ -5,7 +5,7 @@
     <p:sldMasterId id="2147483684" r:id="rId1"/>
   </p:sldMasterIdLst>
   <p:notesMasterIdLst>
-    <p:notesMasterId r:id="rId31"/>
+    <p:notesMasterId r:id="rId30"/>
   </p:notesMasterIdLst>
   <p:sldIdLst>
     <p:sldId id="288" r:id="rId2"/>
@@ -24,19 +24,18 @@
     <p:sldId id="262" r:id="rId15"/>
     <p:sldId id="280" r:id="rId16"/>
     <p:sldId id="281" r:id="rId17"/>
-    <p:sldId id="282" r:id="rId18"/>
-    <p:sldId id="267" r:id="rId19"/>
-    <p:sldId id="279" r:id="rId20"/>
-    <p:sldId id="263" r:id="rId21"/>
-    <p:sldId id="269" r:id="rId22"/>
-    <p:sldId id="270" r:id="rId23"/>
-    <p:sldId id="271" r:id="rId24"/>
-    <p:sldId id="272" r:id="rId25"/>
-    <p:sldId id="273" r:id="rId26"/>
-    <p:sldId id="274" r:id="rId27"/>
-    <p:sldId id="275" r:id="rId28"/>
-    <p:sldId id="286" r:id="rId29"/>
-    <p:sldId id="276" r:id="rId30"/>
+    <p:sldId id="267" r:id="rId18"/>
+    <p:sldId id="279" r:id="rId19"/>
+    <p:sldId id="263" r:id="rId20"/>
+    <p:sldId id="269" r:id="rId21"/>
+    <p:sldId id="270" r:id="rId22"/>
+    <p:sldId id="271" r:id="rId23"/>
+    <p:sldId id="272" r:id="rId24"/>
+    <p:sldId id="273" r:id="rId25"/>
+    <p:sldId id="274" r:id="rId26"/>
+    <p:sldId id="275" r:id="rId27"/>
+    <p:sldId id="286" r:id="rId28"/>
+    <p:sldId id="276" r:id="rId29"/>
   </p:sldIdLst>
   <p:sldSz cx="9144000" cy="6858000" type="screen4x3"/>
   <p:notesSz cx="6858000" cy="9144000"/>
@@ -220,7 +219,7 @@
           <a:p>
             <a:fld id="{FF591605-0622-412E-9A0F-A30D7EFBCC03}" type="datetimeFigureOut">
               <a:rPr lang="en-US" smtClean="0"/>
-              <a:t>11/20/2009</a:t>
+              <a:t>12/15/2009</a:t>
             </a:fld>
             <a:endParaRPr lang="en-US"/>
           </a:p>
@@ -898,7 +897,7 @@
           <a:p>
             <a:fld id="{8A79B42D-FAB0-42F8-B8FC-0BAA5E7F7E3E}" type="slidenum">
               <a:rPr lang="en-US" smtClean="0"/>
-              <a:t>18</a:t>
+              <a:t>17</a:t>
             </a:fld>
             <a:endParaRPr lang="en-US"/>
           </a:p>
@@ -982,7 +981,7 @@
           <a:p>
             <a:fld id="{8A79B42D-FAB0-42F8-B8FC-0BAA5E7F7E3E}" type="slidenum">
               <a:rPr lang="en-US" smtClean="0"/>
-              <a:t>19</a:t>
+              <a:t>18</a:t>
             </a:fld>
             <a:endParaRPr lang="en-US"/>
           </a:p>
@@ -1070,7 +1069,7 @@
           <a:p>
             <a:fld id="{8A79B42D-FAB0-42F8-B8FC-0BAA5E7F7E3E}" type="slidenum">
               <a:rPr lang="en-US" smtClean="0"/>
-              <a:t>20</a:t>
+              <a:t>19</a:t>
             </a:fld>
             <a:endParaRPr lang="en-US"/>
           </a:p>
@@ -1186,7 +1185,7 @@
           <a:p>
             <a:fld id="{8A79B42D-FAB0-42F8-B8FC-0BAA5E7F7E3E}" type="slidenum">
               <a:rPr lang="en-US" smtClean="0"/>
-              <a:t>21</a:t>
+              <a:t>20</a:t>
             </a:fld>
             <a:endParaRPr lang="en-US"/>
           </a:p>
@@ -1327,7 +1326,7 @@
           <a:p>
             <a:fld id="{8A79B42D-FAB0-42F8-B8FC-0BAA5E7F7E3E}" type="slidenum">
               <a:rPr lang="en-US" smtClean="0"/>
-              <a:t>22</a:t>
+              <a:t>21</a:t>
             </a:fld>
             <a:endParaRPr lang="en-US"/>
           </a:p>
@@ -1468,7 +1467,7 @@
           <a:p>
             <a:fld id="{8A79B42D-FAB0-42F8-B8FC-0BAA5E7F7E3E}" type="slidenum">
               <a:rPr lang="en-US" smtClean="0"/>
-              <a:t>23</a:t>
+              <a:t>22</a:t>
             </a:fld>
             <a:endParaRPr lang="en-US"/>
           </a:p>
@@ -1609,7 +1608,7 @@
           <a:p>
             <a:fld id="{8A79B42D-FAB0-42F8-B8FC-0BAA5E7F7E3E}" type="slidenum">
               <a:rPr lang="en-US" smtClean="0"/>
-              <a:t>24</a:t>
+              <a:t>23</a:t>
             </a:fld>
             <a:endParaRPr lang="en-US"/>
           </a:p>
@@ -1750,7 +1749,7 @@
           <a:p>
             <a:fld id="{8A79B42D-FAB0-42F8-B8FC-0BAA5E7F7E3E}" type="slidenum">
               <a:rPr lang="en-US" smtClean="0"/>
-              <a:t>25</a:t>
+              <a:t>24</a:t>
             </a:fld>
             <a:endParaRPr lang="en-US"/>
           </a:p>
@@ -1982,7 +1981,7 @@
           <a:p>
             <a:fld id="{8A79B42D-FAB0-42F8-B8FC-0BAA5E7F7E3E}" type="slidenum">
               <a:rPr lang="en-US" smtClean="0"/>
-              <a:t>29</a:t>
+              <a:t>28</a:t>
             </a:fld>
             <a:endParaRPr lang="en-US"/>
           </a:p>
@@ -2960,7 +2959,7 @@
           <a:p>
             <a:fld id="{B6204BE3-0888-4C92-A3D5-8C39B6D4680B}" type="datetimeFigureOut">
               <a:rPr lang="en-US" smtClean="0"/>
-              <a:t>11/20/2009</a:t>
+              <a:t>12/15/2009</a:t>
             </a:fld>
             <a:endParaRPr lang="en-US"/>
           </a:p>
@@ -3137,7 +3136,7 @@
           <a:p>
             <a:fld id="{B6204BE3-0888-4C92-A3D5-8C39B6D4680B}" type="datetimeFigureOut">
               <a:rPr lang="en-US" smtClean="0"/>
-              <a:t>11/20/2009</a:t>
+              <a:t>12/15/2009</a:t>
             </a:fld>
             <a:endParaRPr lang="en-US"/>
           </a:p>
@@ -3317,7 +3316,7 @@
           <a:p>
             <a:fld id="{B6204BE3-0888-4C92-A3D5-8C39B6D4680B}" type="datetimeFigureOut">
               <a:rPr lang="en-US" smtClean="0"/>
-              <a:t>11/20/2009</a:t>
+              <a:t>12/15/2009</a:t>
             </a:fld>
             <a:endParaRPr lang="en-US"/>
           </a:p>
@@ -3487,7 +3486,7 @@
           <a:p>
             <a:fld id="{B6204BE3-0888-4C92-A3D5-8C39B6D4680B}" type="datetimeFigureOut">
               <a:rPr lang="en-US" smtClean="0"/>
-              <a:t>11/20/2009</a:t>
+              <a:t>12/15/2009</a:t>
             </a:fld>
             <a:endParaRPr lang="en-US"/>
           </a:p>
@@ -3740,7 +3739,7 @@
           <a:p>
             <a:fld id="{B6204BE3-0888-4C92-A3D5-8C39B6D4680B}" type="datetimeFigureOut">
               <a:rPr lang="en-US" smtClean="0"/>
-              <a:t>11/20/2009</a:t>
+              <a:t>12/15/2009</a:t>
             </a:fld>
             <a:endParaRPr lang="en-US"/>
           </a:p>
@@ -4035,7 +4034,7 @@
           <a:p>
             <a:fld id="{B6204BE3-0888-4C92-A3D5-8C39B6D4680B}" type="datetimeFigureOut">
               <a:rPr lang="en-US" smtClean="0"/>
-              <a:t>11/20/2009</a:t>
+              <a:t>12/15/2009</a:t>
             </a:fld>
             <a:endParaRPr lang="en-US"/>
           </a:p>
@@ -4464,7 +4463,7 @@
           <a:p>
             <a:fld id="{B6204BE3-0888-4C92-A3D5-8C39B6D4680B}" type="datetimeFigureOut">
               <a:rPr lang="en-US" smtClean="0"/>
-              <a:t>11/20/2009</a:t>
+              <a:t>12/15/2009</a:t>
             </a:fld>
             <a:endParaRPr lang="en-US"/>
           </a:p>
@@ -4582,7 +4581,7 @@
           <a:p>
             <a:fld id="{B6204BE3-0888-4C92-A3D5-8C39B6D4680B}" type="datetimeFigureOut">
               <a:rPr lang="en-US" smtClean="0"/>
-              <a:t>11/20/2009</a:t>
+              <a:t>12/15/2009</a:t>
             </a:fld>
             <a:endParaRPr lang="en-US"/>
           </a:p>
@@ -4677,7 +4676,7 @@
           <a:p>
             <a:fld id="{B6204BE3-0888-4C92-A3D5-8C39B6D4680B}" type="datetimeFigureOut">
               <a:rPr lang="en-US" smtClean="0"/>
-              <a:t>11/20/2009</a:t>
+              <a:t>12/15/2009</a:t>
             </a:fld>
             <a:endParaRPr lang="en-US"/>
           </a:p>
@@ -4954,7 +4953,7 @@
           <a:p>
             <a:fld id="{B6204BE3-0888-4C92-A3D5-8C39B6D4680B}" type="datetimeFigureOut">
               <a:rPr lang="en-US" smtClean="0"/>
-              <a:t>11/20/2009</a:t>
+              <a:t>12/15/2009</a:t>
             </a:fld>
             <a:endParaRPr lang="en-US"/>
           </a:p>
@@ -5207,7 +5206,7 @@
           <a:p>
             <a:fld id="{B6204BE3-0888-4C92-A3D5-8C39B6D4680B}" type="datetimeFigureOut">
               <a:rPr lang="en-US" smtClean="0"/>
-              <a:t>11/20/2009</a:t>
+              <a:t>12/15/2009</a:t>
             </a:fld>
             <a:endParaRPr lang="en-US"/>
           </a:p>
@@ -5423,7 +5422,7 @@
           <a:p>
             <a:fld id="{B6204BE3-0888-4C92-A3D5-8C39B6D4680B}" type="datetimeFigureOut">
               <a:rPr lang="en-US" smtClean="0"/>
-              <a:t>11/20/2009</a:t>
+              <a:t>12/15/2009</a:t>
             </a:fld>
             <a:endParaRPr lang="en-US"/>
           </a:p>
@@ -6411,7 +6410,7 @@
 </file>
 
 <file path=ppt/slides/slide11.xml><?xml version="1.0" encoding="utf-8"?>
-<p:sld xmlns:a="http://schemas.openxmlformats.org/drawingml/2006/main" xmlns:r="http://schemas.openxmlformats.org/officeDocument/2006/relationships" xmlns:p="http://schemas.openxmlformats.org/presentationml/2006/main" show="0">
+<p:sld xmlns:a="http://schemas.openxmlformats.org/drawingml/2006/main" xmlns:r="http://schemas.openxmlformats.org/officeDocument/2006/relationships" xmlns:p="http://schemas.openxmlformats.org/presentationml/2006/main">
   <p:cSld>
     <p:spTree>
       <p:nvGrpSpPr>
@@ -8314,11 +8313,11 @@
   <p:clrMapOvr>
     <a:masterClrMapping/>
   </p:clrMapOvr>
-  <mc:AlternateContent xmlns:mc="http://schemas.openxmlformats.org/markup-compatibility/2006">
-    <mc:Choice xmlns:p14="http://schemas.microsoft.com/office/powerpoint/2010/main" Requires="p14">
+  <mc:AlternateContent xmlns:mc="http://schemas.openxmlformats.org/markup-compatibility/2006" xmlns:p14="http://schemas.microsoft.com/office/powerpoint/2010/main">
+    <mc:Choice Requires="p14">
       <p:transition spd="slow" p14:dur="2000"/>
     </mc:Choice>
-    <mc:Fallback>
+    <mc:Fallback xmlns="">
       <p:transition xmlns:p14="http://schemas.microsoft.com/office/powerpoint/2010/main" spd="slow"/>
     </mc:Fallback>
   </mc:AlternateContent>
@@ -8438,11 +8437,11 @@
   <p:clrMapOvr>
     <a:masterClrMapping/>
   </p:clrMapOvr>
-  <mc:AlternateContent xmlns:mc="http://schemas.openxmlformats.org/markup-compatibility/2006">
-    <mc:Choice xmlns:p14="http://schemas.microsoft.com/office/powerpoint/2010/main" Requires="p14">
+  <mc:AlternateContent xmlns:mc="http://schemas.openxmlformats.org/markup-compatibility/2006" xmlns:p14="http://schemas.microsoft.com/office/powerpoint/2010/main">
+    <mc:Choice Requires="p14">
       <p:transition spd="slow" p14:dur="2000"/>
     </mc:Choice>
-    <mc:Fallback>
+    <mc:Fallback xmlns="">
       <p:transition xmlns:p14="http://schemas.microsoft.com/office/powerpoint/2010/main" spd="slow"/>
     </mc:Fallback>
   </mc:AlternateContent>
@@ -8457,7 +8456,7 @@
 </file>
 
 <file path=ppt/slides/slide17.xml><?xml version="1.0" encoding="utf-8"?>
-<p:sld xmlns:a="http://schemas.openxmlformats.org/drawingml/2006/main" xmlns:r="http://schemas.openxmlformats.org/officeDocument/2006/relationships" xmlns:p="http://schemas.openxmlformats.org/presentationml/2006/main" show="0">
+<p:sld xmlns:a="http://schemas.openxmlformats.org/drawingml/2006/main" xmlns:r="http://schemas.openxmlformats.org/officeDocument/2006/relationships" xmlns:p="http://schemas.openxmlformats.org/presentationml/2006/main">
   <p:cSld>
     <p:spTree>
       <p:nvGrpSpPr>
@@ -8475,101 +8474,232 @@
       </p:grpSpPr>
       <p:sp>
         <p:nvSpPr>
-          <p:cNvPr id="2" name="Title 1"/>
+          <p:cNvPr id="3" name="Content Placeholder 2"/>
           <p:cNvSpPr>
             <a:spLocks noGrp="1"/>
           </p:cNvSpPr>
           <p:nvPr>
-            <p:ph type="title"/>
-          </p:nvPr>
-        </p:nvSpPr>
-        <p:spPr/>
-        <p:txBody>
-          <a:bodyPr/>
+            <p:ph idx="1"/>
+          </p:nvPr>
+        </p:nvSpPr>
+        <p:spPr>
+          <a:xfrm>
+            <a:off x="381000" y="381000"/>
+            <a:ext cx="8382000" cy="5867400"/>
+          </a:xfrm>
+        </p:spPr>
+        <p:txBody>
+          <a:bodyPr>
+            <a:normAutofit lnSpcReduction="10000"/>
+          </a:bodyPr>
           <a:lstStyle/>
           <a:p>
-            <a:endParaRPr lang="en-US"/>
-          </a:p>
-        </p:txBody>
-      </p:sp>
-      <p:sp>
-        <p:nvSpPr>
-          <p:cNvPr id="3" name="Content Placeholder 2"/>
-          <p:cNvSpPr>
-            <a:spLocks noGrp="1"/>
-          </p:cNvSpPr>
-          <p:nvPr>
-            <p:ph idx="1"/>
-          </p:nvPr>
-        </p:nvSpPr>
-        <p:spPr/>
-        <p:txBody>
-          <a:bodyPr/>
-          <a:lstStyle/>
-          <a:p>
-            <a:endParaRPr lang="en-US"/>
-          </a:p>
-        </p:txBody>
-      </p:sp>
-      <p:pic>
-        <p:nvPicPr>
-          <p:cNvPr id="3074" name="Picture 2" descr="C:\Users\jimmysch\Pictures\1478055489_0eff7c3fac_b.jpg"/>
-          <p:cNvPicPr>
-            <a:picLocks noChangeAspect="1" noChangeArrowheads="1"/>
-          </p:cNvPicPr>
-          <p:nvPr/>
-        </p:nvPicPr>
-        <p:blipFill>
-          <a:blip r:embed="rId2">
-            <a:extLst>
-              <a:ext uri="{28A0092B-C50C-407E-A947-70E740481C1C}">
-                <a14:useLocalDpi xmlns:a14="http://schemas.microsoft.com/office/drawing/2010/main" val="0"/>
-              </a:ext>
-            </a:extLst>
-          </a:blip>
-          <a:srcRect/>
-          <a:stretch>
-            <a:fillRect/>
-          </a:stretch>
-        </p:blipFill>
-        <p:spPr bwMode="auto">
-          <a:xfrm>
-            <a:off x="-76200" y="0"/>
-            <a:ext cx="9753600" cy="7096125"/>
-          </a:xfrm>
-          <a:prstGeom prst="rect">
-            <a:avLst/>
-          </a:prstGeom>
-          <a:noFill/>
-          <a:extLst>
-            <a:ext uri="{909E8E84-426E-40DD-AFC4-6F175D3DCCD1}">
-              <a14:hiddenFill xmlns:a14="http://schemas.microsoft.com/office/drawing/2010/main">
-                <a:solidFill>
-                  <a:srgbClr xmlns:mc="http://schemas.openxmlformats.org/markup-compatibility/2006" val="FFFFFF" mc:Ignorable=""/>
-                </a:solidFill>
-              </a14:hiddenFill>
-            </a:ext>
-          </a:extLst>
-        </p:spPr>
-      </p:pic>
+            <a:pPr marL="0" indent="0">
+              <a:buNone/>
+            </a:pPr>
+            <a:r>
+              <a:rPr lang="en-US" dirty="0" smtClean="0"/>
+              <a:t>Extensibility with scripts</a:t>
+            </a:r>
+          </a:p>
+          <a:p>
+            <a:pPr lvl="1">
+              <a:buFont typeface="Wingdings" pitchFamily="2" charset="2"/>
+              <a:buChar char="v"/>
+            </a:pPr>
+            <a:r>
+              <a:rPr lang="en-US" dirty="0">
+                <a:solidFill>
+                  <a:schemeClr val="bg1">
+                    <a:lumMod val="75000"/>
+                  </a:schemeClr>
+                </a:solidFill>
+              </a:rPr>
+              <a:t> </a:t>
+            </a:r>
+            <a:r>
+              <a:rPr lang="en-US" dirty="0" smtClean="0">
+                <a:solidFill>
+                  <a:schemeClr val="bg1">
+                    <a:lumMod val="75000"/>
+                  </a:schemeClr>
+                </a:solidFill>
+              </a:rPr>
+              <a:t>let everyone make your app great too</a:t>
+            </a:r>
+          </a:p>
+          <a:p>
+            <a:pPr marL="57150" indent="0">
+              <a:buNone/>
+            </a:pPr>
+            <a:endParaRPr lang="en-US" dirty="0" smtClean="0"/>
+          </a:p>
+          <a:p>
+            <a:pPr marL="0" indent="0">
+              <a:buNone/>
+            </a:pPr>
+            <a:r>
+              <a:rPr lang="en-US" dirty="0" smtClean="0"/>
+              <a:t>Ruby is simple enough for non-programmers</a:t>
+            </a:r>
+          </a:p>
+          <a:p>
+            <a:pPr lvl="1">
+              <a:buFont typeface="Wingdings" pitchFamily="2" charset="2"/>
+              <a:buChar char="v"/>
+            </a:pPr>
+            <a:r>
+              <a:rPr lang="en-US" dirty="0">
+                <a:solidFill>
+                  <a:schemeClr val="bg1">
+                    <a:lumMod val="75000"/>
+                  </a:schemeClr>
+                </a:solidFill>
+              </a:rPr>
+              <a:t> </a:t>
+            </a:r>
+            <a:r>
+              <a:rPr lang="en-US" dirty="0" smtClean="0">
+                <a:solidFill>
+                  <a:schemeClr val="bg1">
+                    <a:lumMod val="75000"/>
+                  </a:schemeClr>
+                </a:solidFill>
+              </a:rPr>
+              <a:t>writing tiny scripts for themselves</a:t>
+            </a:r>
+          </a:p>
+          <a:p>
+            <a:pPr marL="57150" indent="0">
+              <a:buNone/>
+            </a:pPr>
+            <a:r>
+              <a:rPr lang="en-US" dirty="0" smtClean="0"/>
+              <a:t>Powerful enough for adding full features</a:t>
+            </a:r>
+          </a:p>
+          <a:p>
+            <a:pPr lvl="1">
+              <a:buFont typeface="Wingdings" pitchFamily="2" charset="2"/>
+              <a:buChar char="v"/>
+            </a:pPr>
+            <a:r>
+              <a:rPr lang="en-US" dirty="0">
+                <a:solidFill>
+                  <a:schemeClr val="bg1">
+                    <a:lumMod val="75000"/>
+                  </a:schemeClr>
+                </a:solidFill>
+              </a:rPr>
+              <a:t> </a:t>
+            </a:r>
+            <a:r>
+              <a:rPr lang="en-US" dirty="0" smtClean="0">
+                <a:solidFill>
+                  <a:schemeClr val="bg1">
+                    <a:lumMod val="75000"/>
+                  </a:schemeClr>
+                </a:solidFill>
+              </a:rPr>
+              <a:t>ecosystem for extensions develops</a:t>
+            </a:r>
+          </a:p>
+          <a:p>
+            <a:pPr lvl="1">
+              <a:buFont typeface="Wingdings" pitchFamily="2" charset="2"/>
+              <a:buChar char="v"/>
+            </a:pPr>
+            <a:r>
+              <a:rPr lang="en-US" dirty="0">
+                <a:solidFill>
+                  <a:schemeClr val="bg1">
+                    <a:lumMod val="75000"/>
+                  </a:schemeClr>
+                </a:solidFill>
+              </a:rPr>
+              <a:t> </a:t>
+            </a:r>
+            <a:r>
+              <a:rPr lang="en-US" dirty="0" smtClean="0">
+                <a:solidFill>
+                  <a:schemeClr val="bg1">
+                    <a:lumMod val="75000"/>
+                  </a:schemeClr>
+                </a:solidFill>
+              </a:rPr>
+              <a:t>deployment of fixes / new features simplified</a:t>
+            </a:r>
+          </a:p>
+          <a:p>
+            <a:pPr marL="57150" indent="0">
+              <a:buNone/>
+            </a:pPr>
+            <a:endParaRPr lang="en-US" dirty="0"/>
+          </a:p>
+          <a:p>
+            <a:pPr marL="57150" indent="0">
+              <a:buNone/>
+            </a:pPr>
+            <a:r>
+              <a:rPr lang="en-US" dirty="0" smtClean="0"/>
+              <a:t>More choices than Ruby</a:t>
+            </a:r>
+          </a:p>
+          <a:p>
+            <a:pPr lvl="1">
+              <a:buFont typeface="Wingdings" pitchFamily="2" charset="2"/>
+              <a:buChar char="v"/>
+            </a:pPr>
+            <a:r>
+              <a:rPr lang="en-US" dirty="0">
+                <a:solidFill>
+                  <a:schemeClr val="bg1">
+                    <a:lumMod val="75000"/>
+                  </a:schemeClr>
+                </a:solidFill>
+              </a:rPr>
+              <a:t> </a:t>
+            </a:r>
+            <a:r>
+              <a:rPr lang="en-US" dirty="0" smtClean="0">
+                <a:solidFill>
+                  <a:schemeClr val="bg1">
+                    <a:lumMod val="75000"/>
+                  </a:schemeClr>
+                </a:solidFill>
+              </a:rPr>
+              <a:t>Python, Scheme, </a:t>
+            </a:r>
+            <a:r>
+              <a:rPr lang="en-US" dirty="0" err="1" smtClean="0">
+                <a:solidFill>
+                  <a:schemeClr val="bg1">
+                    <a:lumMod val="75000"/>
+                  </a:schemeClr>
+                </a:solidFill>
+              </a:rPr>
+              <a:t>Clojure</a:t>
+            </a:r>
+            <a:endParaRPr lang="en-US" dirty="0">
+              <a:solidFill>
+                <a:schemeClr val="bg1">
+                  <a:lumMod val="75000"/>
+                </a:schemeClr>
+              </a:solidFill>
+            </a:endParaRPr>
+          </a:p>
+        </p:txBody>
+      </p:sp>
     </p:spTree>
     <p:extLst>
       <p:ext uri="{BB962C8B-B14F-4D97-AF65-F5344CB8AC3E}">
-        <p14:creationId xmlns:p14="http://schemas.microsoft.com/office/powerpoint/2010/main" val="1296257453"/>
+        <p14:creationId xmlns:p14="http://schemas.microsoft.com/office/powerpoint/2010/main" val="2566796713"/>
       </p:ext>
     </p:extLst>
   </p:cSld>
   <p:clrMapOvr>
     <a:masterClrMapping/>
   </p:clrMapOvr>
-  <mc:AlternateContent xmlns:mc="http://schemas.openxmlformats.org/markup-compatibility/2006">
-    <mc:Choice xmlns:p14="http://schemas.microsoft.com/office/powerpoint/2010/main" Requires="p14">
-      <p:transition spd="slow" p14:dur="2000"/>
-    </mc:Choice>
-    <mc:Fallback>
-      <p:transition xmlns:p14="http://schemas.microsoft.com/office/powerpoint/2010/main" spd="slow"/>
-    </mc:Fallback>
-  </mc:AlternateContent>
   <p:timing>
     <p:tnLst>
       <p:par>
@@ -8599,261 +8729,6 @@
       </p:grpSpPr>
       <p:sp>
         <p:nvSpPr>
-          <p:cNvPr id="3" name="Content Placeholder 2"/>
-          <p:cNvSpPr>
-            <a:spLocks noGrp="1"/>
-          </p:cNvSpPr>
-          <p:nvPr>
-            <p:ph idx="1"/>
-          </p:nvPr>
-        </p:nvSpPr>
-        <p:spPr>
-          <a:xfrm>
-            <a:off x="381000" y="381000"/>
-            <a:ext cx="8382000" cy="5867400"/>
-          </a:xfrm>
-        </p:spPr>
-        <p:txBody>
-          <a:bodyPr>
-            <a:normAutofit lnSpcReduction="10000"/>
-          </a:bodyPr>
-          <a:lstStyle/>
-          <a:p>
-            <a:pPr marL="0" indent="0">
-              <a:buNone/>
-            </a:pPr>
-            <a:r>
-              <a:rPr lang="en-US" dirty="0" smtClean="0"/>
-              <a:t>Extensibility with scripts</a:t>
-            </a:r>
-          </a:p>
-          <a:p>
-            <a:pPr lvl="1">
-              <a:buFont typeface="Wingdings" pitchFamily="2" charset="2"/>
-              <a:buChar char="v"/>
-            </a:pPr>
-            <a:r>
-              <a:rPr lang="en-US" dirty="0">
-                <a:solidFill>
-                  <a:schemeClr val="bg1">
-                    <a:lumMod val="75000"/>
-                  </a:schemeClr>
-                </a:solidFill>
-              </a:rPr>
-              <a:t> </a:t>
-            </a:r>
-            <a:r>
-              <a:rPr lang="en-US" dirty="0" smtClean="0">
-                <a:solidFill>
-                  <a:schemeClr val="bg1">
-                    <a:lumMod val="75000"/>
-                  </a:schemeClr>
-                </a:solidFill>
-              </a:rPr>
-              <a:t>let everyone make your app great too</a:t>
-            </a:r>
-          </a:p>
-          <a:p>
-            <a:pPr marL="57150" indent="0">
-              <a:buNone/>
-            </a:pPr>
-            <a:endParaRPr lang="en-US" dirty="0" smtClean="0"/>
-          </a:p>
-          <a:p>
-            <a:pPr marL="0" indent="0">
-              <a:buNone/>
-            </a:pPr>
-            <a:r>
-              <a:rPr lang="en-US" dirty="0" smtClean="0"/>
-              <a:t>Ruby is simple enough for non-programmers</a:t>
-            </a:r>
-          </a:p>
-          <a:p>
-            <a:pPr lvl="1">
-              <a:buFont typeface="Wingdings" pitchFamily="2" charset="2"/>
-              <a:buChar char="v"/>
-            </a:pPr>
-            <a:r>
-              <a:rPr lang="en-US" dirty="0">
-                <a:solidFill>
-                  <a:schemeClr val="bg1">
-                    <a:lumMod val="75000"/>
-                  </a:schemeClr>
-                </a:solidFill>
-              </a:rPr>
-              <a:t> </a:t>
-            </a:r>
-            <a:r>
-              <a:rPr lang="en-US" dirty="0" smtClean="0">
-                <a:solidFill>
-                  <a:schemeClr val="bg1">
-                    <a:lumMod val="75000"/>
-                  </a:schemeClr>
-                </a:solidFill>
-              </a:rPr>
-              <a:t>writing tiny scripts for themselves</a:t>
-            </a:r>
-          </a:p>
-          <a:p>
-            <a:pPr marL="57150" indent="0">
-              <a:buNone/>
-            </a:pPr>
-            <a:r>
-              <a:rPr lang="en-US" dirty="0" smtClean="0"/>
-              <a:t>Powerful enough for adding full features</a:t>
-            </a:r>
-          </a:p>
-          <a:p>
-            <a:pPr lvl="1">
-              <a:buFont typeface="Wingdings" pitchFamily="2" charset="2"/>
-              <a:buChar char="v"/>
-            </a:pPr>
-            <a:r>
-              <a:rPr lang="en-US" dirty="0">
-                <a:solidFill>
-                  <a:schemeClr val="bg1">
-                    <a:lumMod val="75000"/>
-                  </a:schemeClr>
-                </a:solidFill>
-              </a:rPr>
-              <a:t> </a:t>
-            </a:r>
-            <a:r>
-              <a:rPr lang="en-US" dirty="0" smtClean="0">
-                <a:solidFill>
-                  <a:schemeClr val="bg1">
-                    <a:lumMod val="75000"/>
-                  </a:schemeClr>
-                </a:solidFill>
-              </a:rPr>
-              <a:t>ecosystem for extensions develops</a:t>
-            </a:r>
-          </a:p>
-          <a:p>
-            <a:pPr lvl="1">
-              <a:buFont typeface="Wingdings" pitchFamily="2" charset="2"/>
-              <a:buChar char="v"/>
-            </a:pPr>
-            <a:r>
-              <a:rPr lang="en-US" dirty="0">
-                <a:solidFill>
-                  <a:schemeClr val="bg1">
-                    <a:lumMod val="75000"/>
-                  </a:schemeClr>
-                </a:solidFill>
-              </a:rPr>
-              <a:t> </a:t>
-            </a:r>
-            <a:r>
-              <a:rPr lang="en-US" dirty="0" smtClean="0">
-                <a:solidFill>
-                  <a:schemeClr val="bg1">
-                    <a:lumMod val="75000"/>
-                  </a:schemeClr>
-                </a:solidFill>
-              </a:rPr>
-              <a:t>deployment of fixes / new features simplified</a:t>
-            </a:r>
-          </a:p>
-          <a:p>
-            <a:pPr marL="57150" indent="0">
-              <a:buNone/>
-            </a:pPr>
-            <a:endParaRPr lang="en-US" dirty="0"/>
-          </a:p>
-          <a:p>
-            <a:pPr marL="57150" indent="0">
-              <a:buNone/>
-            </a:pPr>
-            <a:r>
-              <a:rPr lang="en-US" dirty="0" smtClean="0"/>
-              <a:t>More choices than Ruby</a:t>
-            </a:r>
-          </a:p>
-          <a:p>
-            <a:pPr lvl="1">
-              <a:buFont typeface="Wingdings" pitchFamily="2" charset="2"/>
-              <a:buChar char="v"/>
-            </a:pPr>
-            <a:r>
-              <a:rPr lang="en-US" dirty="0">
-                <a:solidFill>
-                  <a:schemeClr val="bg1">
-                    <a:lumMod val="75000"/>
-                  </a:schemeClr>
-                </a:solidFill>
-              </a:rPr>
-              <a:t> </a:t>
-            </a:r>
-            <a:r>
-              <a:rPr lang="en-US" dirty="0" smtClean="0">
-                <a:solidFill>
-                  <a:schemeClr val="bg1">
-                    <a:lumMod val="75000"/>
-                  </a:schemeClr>
-                </a:solidFill>
-              </a:rPr>
-              <a:t>Python, Scheme, </a:t>
-            </a:r>
-            <a:r>
-              <a:rPr lang="en-US" dirty="0" err="1" smtClean="0">
-                <a:solidFill>
-                  <a:schemeClr val="bg1">
-                    <a:lumMod val="75000"/>
-                  </a:schemeClr>
-                </a:solidFill>
-              </a:rPr>
-              <a:t>Clojure</a:t>
-            </a:r>
-            <a:endParaRPr lang="en-US" dirty="0">
-              <a:solidFill>
-                <a:schemeClr val="bg1">
-                  <a:lumMod val="75000"/>
-                </a:schemeClr>
-              </a:solidFill>
-            </a:endParaRPr>
-          </a:p>
-        </p:txBody>
-      </p:sp>
-    </p:spTree>
-    <p:extLst>
-      <p:ext uri="{BB962C8B-B14F-4D97-AF65-F5344CB8AC3E}">
-        <p14:creationId xmlns:p14="http://schemas.microsoft.com/office/powerpoint/2010/main" val="2566796713"/>
-      </p:ext>
-    </p:extLst>
-  </p:cSld>
-  <p:clrMapOvr>
-    <a:masterClrMapping/>
-  </p:clrMapOvr>
-  <p:timing>
-    <p:tnLst>
-      <p:par>
-        <p:cTn xmlns:p14="http://schemas.microsoft.com/office/powerpoint/2010/main" id="1" dur="indefinite" restart="never" nodeType="tmRoot"/>
-      </p:par>
-    </p:tnLst>
-  </p:timing>
-</p:sld>
-</file>
-
-<file path=ppt/slides/slide19.xml><?xml version="1.0" encoding="utf-8"?>
-<p:sld xmlns:a="http://schemas.openxmlformats.org/drawingml/2006/main" xmlns:r="http://schemas.openxmlformats.org/officeDocument/2006/relationships" xmlns:p="http://schemas.openxmlformats.org/presentationml/2006/main">
-  <p:cSld>
-    <p:spTree>
-      <p:nvGrpSpPr>
-        <p:cNvPr id="1" name=""/>
-        <p:cNvGrpSpPr/>
-        <p:nvPr/>
-      </p:nvGrpSpPr>
-      <p:grpSpPr>
-        <a:xfrm>
-          <a:off x="0" y="0"/>
-          <a:ext cx="0" cy="0"/>
-          <a:chOff x="0" y="0"/>
-          <a:chExt cx="0" cy="0"/>
-        </a:xfrm>
-      </p:grpSpPr>
-      <p:sp>
-        <p:nvSpPr>
           <p:cNvPr id="2" name="Title 1"/>
           <p:cNvSpPr>
             <a:spLocks noGrp="1"/>
@@ -8918,143 +8793,7 @@
 </p:sld>
 </file>
 
-<file path=ppt/slides/slide2.xml><?xml version="1.0" encoding="utf-8"?>
-<p:sld xmlns:a="http://schemas.openxmlformats.org/drawingml/2006/main" xmlns:r="http://schemas.openxmlformats.org/officeDocument/2006/relationships" xmlns:p="http://schemas.openxmlformats.org/presentationml/2006/main">
-  <p:cSld>
-    <p:spTree>
-      <p:nvGrpSpPr>
-        <p:cNvPr id="1" name=""/>
-        <p:cNvGrpSpPr/>
-        <p:nvPr/>
-      </p:nvGrpSpPr>
-      <p:grpSpPr>
-        <a:xfrm>
-          <a:off x="0" y="0"/>
-          <a:ext cx="0" cy="0"/>
-          <a:chOff x="0" y="0"/>
-          <a:chExt cx="0" cy="0"/>
-        </a:xfrm>
-      </p:grpSpPr>
-      <p:sp>
-        <p:nvSpPr>
-          <p:cNvPr id="2" name="Title 1"/>
-          <p:cNvSpPr>
-            <a:spLocks noGrp="1"/>
-          </p:cNvSpPr>
-          <p:nvPr>
-            <p:ph type="ctrTitle"/>
-          </p:nvPr>
-        </p:nvSpPr>
-        <p:spPr>
-          <a:xfrm>
-            <a:off x="609600" y="2130425"/>
-            <a:ext cx="7924800" cy="1470025"/>
-          </a:xfrm>
-        </p:spPr>
-        <p:txBody>
-          <a:bodyPr>
-            <a:noAutofit/>
-          </a:bodyPr>
-          <a:lstStyle/>
-          <a:p>
-            <a:r>
-              <a:rPr lang="en-US" sz="9600" dirty="0" err="1" smtClean="0"/>
-              <a:t>IronRuby</a:t>
-            </a:r>
-            <a:endParaRPr lang="en-US" sz="9600" dirty="0"/>
-          </a:p>
-        </p:txBody>
-      </p:sp>
-      <p:sp>
-        <p:nvSpPr>
-          <p:cNvPr id="3" name="Subtitle 2"/>
-          <p:cNvSpPr>
-            <a:spLocks noGrp="1"/>
-          </p:cNvSpPr>
-          <p:nvPr>
-            <p:ph type="subTitle" idx="1"/>
-          </p:nvPr>
-        </p:nvSpPr>
-        <p:spPr>
-          <a:xfrm>
-            <a:off x="609600" y="3886200"/>
-            <a:ext cx="7848600" cy="2209800"/>
-          </a:xfrm>
-        </p:spPr>
-        <p:txBody>
-          <a:bodyPr>
-            <a:normAutofit lnSpcReduction="10000"/>
-          </a:bodyPr>
-          <a:lstStyle/>
-          <a:p>
-            <a:pPr algn="l"/>
-            <a:r>
-              <a:rPr lang="en-US" dirty="0" smtClean="0"/>
-              <a:t>ironruby.net</a:t>
-            </a:r>
-          </a:p>
-          <a:p>
-            <a:pPr algn="l"/>
-            <a:r>
-              <a:rPr lang="en-US" dirty="0" smtClean="0"/>
-              <a:t>github.com/</a:t>
-            </a:r>
-            <a:r>
-              <a:rPr lang="en-US" dirty="0" err="1" smtClean="0"/>
-              <a:t>ironruby</a:t>
-            </a:r>
-            <a:endParaRPr lang="en-US" dirty="0"/>
-          </a:p>
-          <a:p>
-            <a:pPr algn="l"/>
-            <a:r>
-              <a:rPr lang="en-US" dirty="0" smtClean="0"/>
-              <a:t>jimmy.schementi.com/blog</a:t>
-            </a:r>
-          </a:p>
-          <a:p>
-            <a:pPr algn="l"/>
-            <a:r>
-              <a:rPr lang="en-US" dirty="0" smtClean="0"/>
-              <a:t>github.com/</a:t>
-            </a:r>
-            <a:r>
-              <a:rPr lang="en-US" dirty="0" err="1" smtClean="0"/>
-              <a:t>jschementi</a:t>
-            </a:r>
-            <a:r>
-              <a:rPr lang="en-US" dirty="0" smtClean="0"/>
-              <a:t>/rubyconf2009</a:t>
-            </a:r>
-            <a:endParaRPr lang="en-US" dirty="0" smtClean="0"/>
-          </a:p>
-          <a:p>
-            <a:pPr algn="r"/>
-            <a:endParaRPr lang="en-US" dirty="0" smtClean="0"/>
-          </a:p>
-        </p:txBody>
-      </p:sp>
-    </p:spTree>
-    <p:extLst>
-      <p:ext uri="{BB962C8B-B14F-4D97-AF65-F5344CB8AC3E}">
-        <p14:creationId xmlns:p14="http://schemas.microsoft.com/office/powerpoint/2010/main" val="812268048"/>
-      </p:ext>
-    </p:extLst>
-  </p:cSld>
-  <p:clrMapOvr>
-    <a:masterClrMapping/>
-  </p:clrMapOvr>
-  <p:timing>
-    <p:tnLst>
-      <p:par>
-        <p:cTn xmlns:p14="http://schemas.microsoft.com/office/powerpoint/2010/main" id="1" dur="indefinite" restart="never" nodeType="tmRoot"/>
-      </p:par>
-    </p:tnLst>
-  </p:timing>
-</p:sld>
-</file>
-
-<file path=ppt/slides/slide20.xml><?xml version="1.0" encoding="utf-8"?>
+<file path=ppt/slides/slide19.xml><?xml version="1.0" encoding="utf-8"?>
 <p:sld xmlns:a="http://schemas.openxmlformats.org/drawingml/2006/main" xmlns:r="http://schemas.openxmlformats.org/officeDocument/2006/relationships" xmlns:p="http://schemas.openxmlformats.org/presentationml/2006/main">
   <p:cSld>
     <p:spTree>
@@ -9582,6 +9321,241 @@
 </p:sld>
 </file>
 
+<file path=ppt/slides/slide2.xml><?xml version="1.0" encoding="utf-8"?>
+<p:sld xmlns:a="http://schemas.openxmlformats.org/drawingml/2006/main" xmlns:r="http://schemas.openxmlformats.org/officeDocument/2006/relationships" xmlns:p="http://schemas.openxmlformats.org/presentationml/2006/main">
+  <p:cSld>
+    <p:spTree>
+      <p:nvGrpSpPr>
+        <p:cNvPr id="1" name=""/>
+        <p:cNvGrpSpPr/>
+        <p:nvPr/>
+      </p:nvGrpSpPr>
+      <p:grpSpPr>
+        <a:xfrm>
+          <a:off x="0" y="0"/>
+          <a:ext cx="0" cy="0"/>
+          <a:chOff x="0" y="0"/>
+          <a:chExt cx="0" cy="0"/>
+        </a:xfrm>
+      </p:grpSpPr>
+      <p:sp>
+        <p:nvSpPr>
+          <p:cNvPr id="2" name="Title 1"/>
+          <p:cNvSpPr>
+            <a:spLocks noGrp="1"/>
+          </p:cNvSpPr>
+          <p:nvPr>
+            <p:ph type="ctrTitle"/>
+          </p:nvPr>
+        </p:nvSpPr>
+        <p:spPr>
+          <a:xfrm>
+            <a:off x="609600" y="2130425"/>
+            <a:ext cx="7924800" cy="1470025"/>
+          </a:xfrm>
+        </p:spPr>
+        <p:txBody>
+          <a:bodyPr>
+            <a:noAutofit/>
+          </a:bodyPr>
+          <a:lstStyle/>
+          <a:p>
+            <a:r>
+              <a:rPr lang="en-US" sz="9600" dirty="0" err="1" smtClean="0"/>
+              <a:t>IronRuby</a:t>
+            </a:r>
+            <a:endParaRPr lang="en-US" sz="9600" dirty="0"/>
+          </a:p>
+        </p:txBody>
+      </p:sp>
+      <p:sp>
+        <p:nvSpPr>
+          <p:cNvPr id="3" name="Subtitle 2"/>
+          <p:cNvSpPr>
+            <a:spLocks noGrp="1"/>
+          </p:cNvSpPr>
+          <p:nvPr>
+            <p:ph type="subTitle" idx="1"/>
+          </p:nvPr>
+        </p:nvSpPr>
+        <p:spPr>
+          <a:xfrm>
+            <a:off x="609600" y="3886200"/>
+            <a:ext cx="7848600" cy="2209800"/>
+          </a:xfrm>
+        </p:spPr>
+        <p:txBody>
+          <a:bodyPr>
+            <a:normAutofit lnSpcReduction="10000"/>
+          </a:bodyPr>
+          <a:lstStyle/>
+          <a:p>
+            <a:pPr algn="l"/>
+            <a:r>
+              <a:rPr lang="en-US" dirty="0" smtClean="0"/>
+              <a:t>ironruby.net</a:t>
+            </a:r>
+          </a:p>
+          <a:p>
+            <a:pPr algn="l"/>
+            <a:r>
+              <a:rPr lang="en-US" dirty="0" smtClean="0"/>
+              <a:t>github.com/</a:t>
+            </a:r>
+            <a:r>
+              <a:rPr lang="en-US" dirty="0" err="1" smtClean="0"/>
+              <a:t>ironruby</a:t>
+            </a:r>
+            <a:endParaRPr lang="en-US" dirty="0"/>
+          </a:p>
+          <a:p>
+            <a:pPr algn="l"/>
+            <a:r>
+              <a:rPr lang="en-US" dirty="0" smtClean="0"/>
+              <a:t>jimmy.schementi.com/blog</a:t>
+            </a:r>
+          </a:p>
+          <a:p>
+            <a:pPr algn="l"/>
+            <a:r>
+              <a:rPr lang="en-US" dirty="0" smtClean="0"/>
+              <a:t>github.com/</a:t>
+            </a:r>
+            <a:r>
+              <a:rPr lang="en-US" dirty="0" err="1" smtClean="0"/>
+              <a:t>jschementi</a:t>
+            </a:r>
+            <a:r>
+              <a:rPr lang="en-US" dirty="0" smtClean="0"/>
+              <a:t>/rubyconf2009</a:t>
+            </a:r>
+          </a:p>
+          <a:p>
+            <a:pPr algn="r"/>
+            <a:endParaRPr lang="en-US" dirty="0" smtClean="0"/>
+          </a:p>
+        </p:txBody>
+      </p:sp>
+    </p:spTree>
+    <p:extLst>
+      <p:ext uri="{BB962C8B-B14F-4D97-AF65-F5344CB8AC3E}">
+        <p14:creationId xmlns:p14="http://schemas.microsoft.com/office/powerpoint/2010/main" val="812268048"/>
+      </p:ext>
+    </p:extLst>
+  </p:cSld>
+  <p:clrMapOvr>
+    <a:masterClrMapping/>
+  </p:clrMapOvr>
+  <p:timing>
+    <p:tnLst>
+      <p:par>
+        <p:cTn xmlns:p14="http://schemas.microsoft.com/office/powerpoint/2010/main" id="1" dur="indefinite" restart="never" nodeType="tmRoot"/>
+      </p:par>
+    </p:tnLst>
+  </p:timing>
+</p:sld>
+</file>
+
+<file path=ppt/slides/slide20.xml><?xml version="1.0" encoding="utf-8"?>
+<p:sld xmlns:a="http://schemas.openxmlformats.org/drawingml/2006/main" xmlns:r="http://schemas.openxmlformats.org/officeDocument/2006/relationships" xmlns:p="http://schemas.openxmlformats.org/presentationml/2006/main">
+  <p:cSld>
+    <p:spTree>
+      <p:nvGrpSpPr>
+        <p:cNvPr id="1" name=""/>
+        <p:cNvGrpSpPr/>
+        <p:nvPr/>
+      </p:nvGrpSpPr>
+      <p:grpSpPr>
+        <a:xfrm>
+          <a:off x="0" y="0"/>
+          <a:ext cx="0" cy="0"/>
+          <a:chOff x="0" y="0"/>
+          <a:chExt cx="0" cy="0"/>
+        </a:xfrm>
+      </p:grpSpPr>
+      <p:sp>
+        <p:nvSpPr>
+          <p:cNvPr id="2" name="Title 1"/>
+          <p:cNvSpPr>
+            <a:spLocks noGrp="1"/>
+          </p:cNvSpPr>
+          <p:nvPr>
+            <p:ph type="ctrTitle"/>
+          </p:nvPr>
+        </p:nvSpPr>
+        <p:spPr>
+          <a:xfrm>
+            <a:off x="609600" y="2130425"/>
+            <a:ext cx="7924800" cy="1470025"/>
+          </a:xfrm>
+        </p:spPr>
+        <p:txBody>
+          <a:bodyPr>
+            <a:noAutofit/>
+          </a:bodyPr>
+          <a:lstStyle/>
+          <a:p>
+            <a:r>
+              <a:rPr lang="en-US" sz="6600" dirty="0" err="1" smtClean="0"/>
+              <a:t>IronRuby</a:t>
+            </a:r>
+            <a:r>
+              <a:rPr lang="en-US" sz="6600" dirty="0" smtClean="0"/>
+              <a:t> 1.0 RC1</a:t>
+            </a:r>
+            <a:endParaRPr lang="en-US" sz="6600" dirty="0"/>
+          </a:p>
+        </p:txBody>
+      </p:sp>
+      <p:sp>
+        <p:nvSpPr>
+          <p:cNvPr id="4" name="Subtitle 3"/>
+          <p:cNvSpPr>
+            <a:spLocks noGrp="1"/>
+          </p:cNvSpPr>
+          <p:nvPr>
+            <p:ph type="subTitle" idx="1"/>
+          </p:nvPr>
+        </p:nvSpPr>
+        <p:spPr>
+          <a:xfrm>
+            <a:off x="609600" y="3886200"/>
+            <a:ext cx="8534400" cy="1752600"/>
+          </a:xfrm>
+        </p:spPr>
+        <p:txBody>
+          <a:bodyPr/>
+          <a:lstStyle/>
+          <a:p>
+            <a:pPr algn="l"/>
+            <a:r>
+              <a:rPr lang="en-US" dirty="0" smtClean="0"/>
+              <a:t>http://ironruby.net/download</a:t>
+            </a:r>
+            <a:endParaRPr lang="en-US" dirty="0"/>
+          </a:p>
+        </p:txBody>
+      </p:sp>
+    </p:spTree>
+    <p:extLst>
+      <p:ext uri="{BB962C8B-B14F-4D97-AF65-F5344CB8AC3E}">
+        <p14:creationId xmlns:p14="http://schemas.microsoft.com/office/powerpoint/2010/main" val="404952260"/>
+      </p:ext>
+    </p:extLst>
+  </p:cSld>
+  <p:clrMapOvr>
+    <a:masterClrMapping/>
+  </p:clrMapOvr>
+  <p:timing>
+    <p:tnLst>
+      <p:par>
+        <p:cTn xmlns:p14="http://schemas.microsoft.com/office/powerpoint/2010/main" id="1" dur="indefinite" restart="never" nodeType="tmRoot"/>
+      </p:par>
+    </p:tnLst>
+  </p:timing>
+</p:sld>
+</file>
+
 <file path=ppt/slides/slide21.xml><?xml version="1.0" encoding="utf-8"?>
 <p:sld xmlns:a="http://schemas.openxmlformats.org/drawingml/2006/main" xmlns:r="http://schemas.openxmlformats.org/officeDocument/2006/relationships" xmlns:p="http://schemas.openxmlformats.org/presentationml/2006/main">
   <p:cSld>
@@ -9601,71 +9575,335 @@
       </p:grpSpPr>
       <p:sp>
         <p:nvSpPr>
-          <p:cNvPr id="2" name="Title 1"/>
+          <p:cNvPr id="3" name="Content Placeholder 2"/>
           <p:cNvSpPr>
             <a:spLocks noGrp="1"/>
           </p:cNvSpPr>
           <p:nvPr>
-            <p:ph type="ctrTitle"/>
+            <p:ph idx="1"/>
           </p:nvPr>
         </p:nvSpPr>
         <p:spPr>
           <a:xfrm>
-            <a:off x="609600" y="2130425"/>
-            <a:ext cx="7924800" cy="1470025"/>
+            <a:off x="381000" y="0"/>
+            <a:ext cx="8382000" cy="6858000"/>
           </a:xfrm>
         </p:spPr>
         <p:txBody>
-          <a:bodyPr>
-            <a:noAutofit/>
+          <a:bodyPr anchor="ctr">
+            <a:normAutofit fontScale="92500" lnSpcReduction="20000"/>
           </a:bodyPr>
           <a:lstStyle/>
           <a:p>
-            <a:r>
-              <a:rPr lang="en-US" sz="6600" dirty="0" err="1" smtClean="0"/>
-              <a:t>IronRuby</a:t>
-            </a:r>
-            <a:r>
-              <a:rPr lang="en-US" sz="6600" dirty="0" smtClean="0"/>
-              <a:t> 1.0 RC1</a:t>
-            </a:r>
-            <a:endParaRPr lang="en-US" sz="6600" dirty="0"/>
-          </a:p>
-        </p:txBody>
-      </p:sp>
-      <p:sp>
-        <p:nvSpPr>
-          <p:cNvPr id="4" name="Subtitle 3"/>
-          <p:cNvSpPr>
-            <a:spLocks noGrp="1"/>
-          </p:cNvSpPr>
-          <p:nvPr>
-            <p:ph type="subTitle" idx="1"/>
-          </p:nvPr>
-        </p:nvSpPr>
-        <p:spPr>
-          <a:xfrm>
-            <a:off x="609600" y="3886200"/>
-            <a:ext cx="8534400" cy="1752600"/>
-          </a:xfrm>
-        </p:spPr>
-        <p:txBody>
-          <a:bodyPr/>
-          <a:lstStyle/>
-          <a:p>
-            <a:pPr algn="l"/>
+            <a:pPr marL="0" indent="0">
+              <a:buNone/>
+            </a:pPr>
+            <a:r>
+              <a:rPr lang="en-US" sz="4300" dirty="0" smtClean="0"/>
+              <a:t>Performance</a:t>
+            </a:r>
+          </a:p>
+          <a:p>
+            <a:pPr lvl="1">
+              <a:buFont typeface="Wingdings" pitchFamily="2" charset="2"/>
+              <a:buChar char="v"/>
+            </a:pPr>
+            <a:r>
+              <a:rPr lang="en-US" sz="3000" dirty="0" smtClean="0"/>
+              <a:t> Goal: </a:t>
+            </a:r>
+            <a:r>
+              <a:rPr lang="en-US" sz="3000" i="1" dirty="0" smtClean="0"/>
+              <a:t>faster</a:t>
+            </a:r>
+            <a:r>
+              <a:rPr lang="en-US" sz="3000" dirty="0" smtClean="0"/>
+              <a:t> than MRI</a:t>
+            </a:r>
+          </a:p>
+          <a:p>
+            <a:pPr lvl="1">
+              <a:buFont typeface="Wingdings" pitchFamily="2" charset="2"/>
+              <a:buChar char="v"/>
+            </a:pPr>
+            <a:r>
+              <a:rPr lang="en-US" sz="3000" dirty="0"/>
+              <a:t> </a:t>
+            </a:r>
+            <a:r>
+              <a:rPr lang="en-US" sz="3000" dirty="0" smtClean="0"/>
+              <a:t>Goal: within order-of-magnitude of </a:t>
+            </a:r>
+            <a:r>
+              <a:rPr lang="en-US" sz="3000" dirty="0" err="1" smtClean="0"/>
+              <a:t>JRuby</a:t>
+            </a:r>
+            <a:endParaRPr lang="en-US" sz="3000" dirty="0"/>
+          </a:p>
+          <a:p>
+            <a:pPr marL="457200" lvl="1" indent="0">
+              <a:buNone/>
+            </a:pPr>
+            <a:endParaRPr lang="en-US" sz="3000" dirty="0" smtClean="0"/>
+          </a:p>
+          <a:p>
+            <a:pPr marL="0" indent="0">
+              <a:buNone/>
+            </a:pPr>
             <a:r>
               <a:rPr lang="en-US" dirty="0" smtClean="0"/>
-              <a:t>http://ironruby.net/download</a:t>
+              <a:t>Throughput</a:t>
+            </a:r>
+          </a:p>
+          <a:p>
+            <a:pPr lvl="1">
+              <a:buFont typeface="Wingdings" pitchFamily="2" charset="2"/>
+              <a:buChar char="v"/>
+            </a:pPr>
+            <a:r>
+              <a:rPr lang="en-US" dirty="0" smtClean="0"/>
+              <a:t> Example: ruby-benchmark-suite</a:t>
+            </a:r>
+          </a:p>
+          <a:p>
+            <a:pPr lvl="1">
+              <a:buFont typeface="Wingdings" pitchFamily="2" charset="2"/>
+              <a:buChar char="v"/>
+            </a:pPr>
+            <a:r>
+              <a:rPr lang="en-US" dirty="0" smtClean="0"/>
+              <a:t> </a:t>
+            </a:r>
+            <a:r>
+              <a:rPr lang="en-US" dirty="0" smtClean="0">
+                <a:solidFill>
+                  <a:srgbClr xmlns:mc="http://schemas.openxmlformats.org/markup-compatibility/2006" xmlns:a14="http://schemas.microsoft.com/office/drawing/2010/main" val="00FF00" mc:Ignorable=""/>
+                </a:solidFill>
+              </a:rPr>
+              <a:t>2x</a:t>
+            </a:r>
+            <a:r>
+              <a:rPr lang="en-US" dirty="0" smtClean="0"/>
+              <a:t> faster than MRI via </a:t>
+            </a:r>
+            <a:r>
+              <a:rPr lang="en-US" dirty="0" err="1" smtClean="0"/>
+              <a:t>RubyInstaller</a:t>
+            </a:r>
+            <a:endParaRPr lang="en-US" dirty="0" smtClean="0"/>
+          </a:p>
+          <a:p>
+            <a:pPr lvl="1">
+              <a:buFont typeface="Wingdings" pitchFamily="2" charset="2"/>
+              <a:buChar char="v"/>
+            </a:pPr>
+            <a:r>
+              <a:rPr lang="en-US" dirty="0"/>
+              <a:t> </a:t>
+            </a:r>
+            <a:r>
+              <a:rPr lang="en-US" dirty="0" smtClean="0">
+                <a:solidFill>
+                  <a:srgbClr xmlns:mc="http://schemas.openxmlformats.org/markup-compatibility/2006" xmlns:a14="http://schemas.microsoft.com/office/drawing/2010/main" val="00FF00" mc:Ignorable=""/>
+                </a:solidFill>
+              </a:rPr>
+              <a:t>6x</a:t>
+            </a:r>
+            <a:r>
+              <a:rPr lang="en-US" dirty="0" smtClean="0"/>
+              <a:t> faster than MRI via One-Click Installer</a:t>
+            </a:r>
+          </a:p>
+          <a:p>
+            <a:pPr lvl="1">
+              <a:buFont typeface="Wingdings" pitchFamily="2" charset="2"/>
+              <a:buChar char="v"/>
+            </a:pPr>
+            <a:r>
+              <a:rPr lang="en-US" dirty="0"/>
+              <a:t> </a:t>
+            </a:r>
+            <a:r>
+              <a:rPr lang="en-US" dirty="0" smtClean="0">
+                <a:solidFill>
+                  <a:srgbClr xmlns:mc="http://schemas.openxmlformats.org/markup-compatibility/2006" xmlns:a14="http://schemas.microsoft.com/office/drawing/2010/main" val="FF0000" mc:Ignorable=""/>
+                </a:solidFill>
+              </a:rPr>
+              <a:t>-1.5x</a:t>
+            </a:r>
+            <a:r>
+              <a:rPr lang="en-US" dirty="0" smtClean="0"/>
+              <a:t> slower than </a:t>
+            </a:r>
+            <a:r>
+              <a:rPr lang="en-US" dirty="0" err="1" smtClean="0"/>
+              <a:t>JRuby</a:t>
             </a:r>
             <a:endParaRPr lang="en-US" dirty="0"/>
+          </a:p>
+          <a:p>
+            <a:pPr lvl="1">
+              <a:buFont typeface="Wingdings" pitchFamily="2" charset="2"/>
+              <a:buChar char="v"/>
+            </a:pPr>
+            <a:r>
+              <a:rPr lang="en-US" dirty="0" smtClean="0">
+                <a:solidFill>
+                  <a:srgbClr xmlns:mc="http://schemas.openxmlformats.org/markup-compatibility/2006" xmlns:a14="http://schemas.microsoft.com/office/drawing/2010/main" val="FFFF00" mc:Ignorable=""/>
+                </a:solidFill>
+              </a:rPr>
+              <a:t> Need to improve a bit on this by 1.0</a:t>
+            </a:r>
+          </a:p>
+          <a:p>
+            <a:pPr marL="457200" lvl="1" indent="0">
+              <a:buNone/>
+            </a:pPr>
+            <a:endParaRPr lang="en-US" dirty="0" smtClean="0"/>
+          </a:p>
+          <a:p>
+            <a:pPr marL="57150" indent="0">
+              <a:buNone/>
+            </a:pPr>
+            <a:r>
+              <a:rPr lang="en-US" dirty="0" smtClean="0"/>
+              <a:t>Startup</a:t>
+            </a:r>
+          </a:p>
+          <a:p>
+            <a:pPr lvl="1">
+              <a:buFont typeface="Wingdings" pitchFamily="2" charset="2"/>
+              <a:buChar char="v"/>
+            </a:pPr>
+            <a:r>
+              <a:rPr lang="en-US" dirty="0" smtClean="0"/>
+              <a:t> Example:   </a:t>
+            </a:r>
+            <a:r>
+              <a:rPr lang="en-US" dirty="0" smtClean="0">
+                <a:latin typeface="Consolas" pitchFamily="49" charset="0"/>
+                <a:cs typeface="Consolas" pitchFamily="49" charset="0"/>
+              </a:rPr>
+              <a:t>require '</a:t>
+            </a:r>
+            <a:r>
+              <a:rPr lang="en-US" dirty="0" err="1" smtClean="0">
+                <a:latin typeface="Consolas" pitchFamily="49" charset="0"/>
+                <a:cs typeface="Consolas" pitchFamily="49" charset="0"/>
+              </a:rPr>
+              <a:t>activesupport</a:t>
+            </a:r>
+            <a:r>
+              <a:rPr lang="en-US" dirty="0" smtClean="0">
+                <a:latin typeface="Consolas" pitchFamily="49" charset="0"/>
+                <a:cs typeface="Consolas" pitchFamily="49" charset="0"/>
+              </a:rPr>
+              <a:t>'</a:t>
+            </a:r>
+          </a:p>
+          <a:p>
+            <a:pPr lvl="1">
+              <a:buFont typeface="Wingdings" pitchFamily="2" charset="2"/>
+              <a:buChar char="v"/>
+            </a:pPr>
+            <a:r>
+              <a:rPr lang="en-US" dirty="0" smtClean="0"/>
+              <a:t> </a:t>
+            </a:r>
+            <a:r>
+              <a:rPr lang="en-US" dirty="0" smtClean="0">
+                <a:solidFill>
+                  <a:srgbClr xmlns:mc="http://schemas.openxmlformats.org/markup-compatibility/2006" xmlns:a14="http://schemas.microsoft.com/office/drawing/2010/main" val="FF0000" mc:Ignorable=""/>
+                </a:solidFill>
+              </a:rPr>
+              <a:t>4x</a:t>
+            </a:r>
+            <a:r>
+              <a:rPr lang="en-US" dirty="0" smtClean="0"/>
+              <a:t> slower than MRI via </a:t>
+            </a:r>
+            <a:r>
+              <a:rPr lang="en-US" dirty="0" err="1" smtClean="0"/>
+              <a:t>RubyInstaller</a:t>
+            </a:r>
+            <a:endParaRPr lang="en-US" dirty="0" smtClean="0"/>
+          </a:p>
+          <a:p>
+            <a:pPr lvl="1">
+              <a:buFont typeface="Wingdings" pitchFamily="2" charset="2"/>
+              <a:buChar char="v"/>
+            </a:pPr>
+            <a:r>
+              <a:rPr lang="en-US" dirty="0" smtClean="0"/>
+              <a:t> </a:t>
+            </a:r>
+            <a:r>
+              <a:rPr lang="en-US" dirty="0" smtClean="0">
+                <a:solidFill>
+                  <a:srgbClr xmlns:mc="http://schemas.openxmlformats.org/markup-compatibility/2006" xmlns:a14="http://schemas.microsoft.com/office/drawing/2010/main" val="FF0000" mc:Ignorable=""/>
+                </a:solidFill>
+              </a:rPr>
+              <a:t>2x</a:t>
+            </a:r>
+            <a:r>
+              <a:rPr lang="en-US" dirty="0" smtClean="0"/>
+              <a:t> slower than </a:t>
+            </a:r>
+            <a:r>
+              <a:rPr lang="en-US" dirty="0" err="1" smtClean="0"/>
+              <a:t>Jruby</a:t>
+            </a:r>
+            <a:endParaRPr lang="en-US" dirty="0" smtClean="0"/>
+          </a:p>
+          <a:p>
+            <a:pPr lvl="1">
+              <a:buFont typeface="Wingdings" pitchFamily="2" charset="2"/>
+              <a:buChar char="v"/>
+            </a:pPr>
+            <a:r>
+              <a:rPr lang="en-US" dirty="0" smtClean="0">
+                <a:solidFill>
+                  <a:srgbClr xmlns:mc="http://schemas.openxmlformats.org/markup-compatibility/2006" xmlns:a14="http://schemas.microsoft.com/office/drawing/2010/main" val="C00000" mc:Ignorable=""/>
+                </a:solidFill>
+              </a:rPr>
+              <a:t> A </a:t>
+            </a:r>
+            <a:r>
+              <a:rPr lang="en-US" u="sng" dirty="0" smtClean="0">
+                <a:solidFill>
+                  <a:srgbClr xmlns:mc="http://schemas.openxmlformats.org/markup-compatibility/2006" xmlns:a14="http://schemas.microsoft.com/office/drawing/2010/main" val="C00000" mc:Ignorable=""/>
+                </a:solidFill>
+              </a:rPr>
+              <a:t>must-fix </a:t>
+            </a:r>
+            <a:r>
+              <a:rPr lang="en-US" dirty="0" smtClean="0">
+                <a:solidFill>
+                  <a:srgbClr xmlns:mc="http://schemas.openxmlformats.org/markup-compatibility/2006" xmlns:a14="http://schemas.microsoft.com/office/drawing/2010/main" val="C00000" mc:Ignorable=""/>
+                </a:solidFill>
+              </a:rPr>
+              <a:t>for 1.0 – must be on par with </a:t>
+            </a:r>
+            <a:r>
+              <a:rPr lang="en-US" dirty="0" err="1" smtClean="0">
+                <a:solidFill>
+                  <a:srgbClr xmlns:mc="http://schemas.openxmlformats.org/markup-compatibility/2006" xmlns:a14="http://schemas.microsoft.com/office/drawing/2010/main" val="C00000" mc:Ignorable=""/>
+                </a:solidFill>
+              </a:rPr>
+              <a:t>JRuby</a:t>
+            </a:r>
+            <a:endParaRPr lang="en-US" u="sng" dirty="0" smtClean="0">
+              <a:solidFill>
+                <a:srgbClr xmlns:mc="http://schemas.openxmlformats.org/markup-compatibility/2006" xmlns:a14="http://schemas.microsoft.com/office/drawing/2010/main" val="C00000" mc:Ignorable=""/>
+              </a:solidFill>
+            </a:endParaRPr>
           </a:p>
         </p:txBody>
       </p:sp>
     </p:spTree>
     <p:extLst>
       <p:ext uri="{BB962C8B-B14F-4D97-AF65-F5344CB8AC3E}">
-        <p14:creationId xmlns:p14="http://schemas.microsoft.com/office/powerpoint/2010/main" val="404952260"/>
+        <p14:creationId xmlns:p14="http://schemas.microsoft.com/office/powerpoint/2010/main" val="2690338689"/>
       </p:ext>
     </p:extLst>
   </p:cSld>
@@ -9711,13 +9949,13 @@
         </p:nvSpPr>
         <p:spPr>
           <a:xfrm>
-            <a:off x="381000" y="0"/>
-            <a:ext cx="8382000" cy="6858000"/>
+            <a:off x="381000" y="419100"/>
+            <a:ext cx="8382000" cy="6019800"/>
           </a:xfrm>
         </p:spPr>
         <p:txBody>
           <a:bodyPr anchor="ctr">
-            <a:normAutofit fontScale="92500" lnSpcReduction="20000"/>
+            <a:normAutofit fontScale="85000" lnSpcReduction="20000"/>
           </a:bodyPr>
           <a:lstStyle/>
           <a:p>
@@ -9726,7 +9964,7 @@
             </a:pPr>
             <a:r>
               <a:rPr lang="en-US" sz="4300" dirty="0" smtClean="0"/>
-              <a:t>Performance</a:t>
+              <a:t>Compatibility</a:t>
             </a:r>
           </a:p>
           <a:p>
@@ -9739,12 +9977,24 @@
               <a:t> Goal: </a:t>
             </a:r>
             <a:r>
-              <a:rPr lang="en-US" sz="3000" i="1" dirty="0" smtClean="0"/>
-              <a:t>faster</a:t>
+              <a:rPr lang="en-US" sz="3000" dirty="0" smtClean="0">
+                <a:solidFill>
+                  <a:srgbClr xmlns:mc="http://schemas.openxmlformats.org/markup-compatibility/2006" xmlns:a14="http://schemas.microsoft.com/office/drawing/2010/main" val="00FF00" mc:Ignorable=""/>
+                </a:solidFill>
+              </a:rPr>
+              <a:t>&gt;</a:t>
             </a:r>
             <a:r>
               <a:rPr lang="en-US" sz="3000" dirty="0" smtClean="0"/>
-              <a:t> than MRI</a:t>
+              <a:t> </a:t>
+            </a:r>
+            <a:r>
+              <a:rPr lang="en-US" sz="3000" dirty="0" smtClean="0">
+                <a:solidFill>
+                  <a:srgbClr xmlns:mc="http://schemas.openxmlformats.org/markup-compatibility/2006" xmlns:a14="http://schemas.microsoft.com/office/drawing/2010/main" val="00FF00" mc:Ignorable=""/>
+                </a:solidFill>
+              </a:rPr>
+              <a:t>90% passing</a:t>
             </a:r>
           </a:p>
           <a:p>
@@ -9758,27 +10008,47 @@
             </a:r>
             <a:r>
               <a:rPr lang="en-US" sz="3000" dirty="0" smtClean="0"/>
-              <a:t>Goal: within order-of-magnitude of </a:t>
+              <a:t>Must have really good reason </a:t>
             </a:r>
             <a:r>
               <a:rPr lang="en-US" sz="3000" dirty="0" err="1" smtClean="0"/>
-              <a:t>JRuby</a:t>
-            </a:r>
-            <a:endParaRPr lang="en-US" sz="3000" dirty="0"/>
-          </a:p>
-          <a:p>
-            <a:pPr marL="457200" lvl="1" indent="0">
-              <a:buNone/>
-            </a:pPr>
+              <a:t>foreach</a:t>
+            </a:r>
+            <a:r>
+              <a:rPr lang="en-US" sz="3000" dirty="0" smtClean="0"/>
+              <a:t> failing </a:t>
+            </a:r>
+            <a:r>
+              <a:rPr lang="en-US" sz="3000" dirty="0" err="1" smtClean="0"/>
+              <a:t>RubySpecs</a:t>
+            </a:r>
             <a:endParaRPr lang="en-US" sz="3000" dirty="0" smtClean="0"/>
           </a:p>
           <a:p>
             <a:pPr marL="0" indent="0">
               <a:buNone/>
             </a:pPr>
+            <a:endParaRPr lang="en-US" dirty="0" smtClean="0"/>
+          </a:p>
+          <a:p>
+            <a:pPr marL="0" indent="0">
+              <a:buNone/>
+            </a:pPr>
+            <a:r>
+              <a:rPr lang="en-US" dirty="0" err="1" smtClean="0"/>
+              <a:t>RubySpec</a:t>
+            </a:r>
             <a:r>
               <a:rPr lang="en-US" dirty="0" smtClean="0"/>
-              <a:t>Throughput</a:t>
+              <a:t>:			</a:t>
+            </a:r>
+            <a:r>
+              <a:rPr lang="en-US" b="1" dirty="0" smtClean="0">
+                <a:solidFill>
+                  <a:srgbClr xmlns:mc="http://schemas.openxmlformats.org/markup-compatibility/2006" xmlns:a14="http://schemas.microsoft.com/office/drawing/2010/main" val="00FF00" mc:Ignorable=""/>
+                </a:solidFill>
+              </a:rPr>
+              <a:t>92%</a:t>
             </a:r>
           </a:p>
           <a:p>
@@ -9787,8 +10057,20 @@
               <a:buChar char="v"/>
             </a:pPr>
             <a:r>
+              <a:rPr lang="en-US" dirty="0"/>
+              <a:t> </a:t>
+            </a:r>
+            <a:r>
               <a:rPr lang="en-US" dirty="0" smtClean="0"/>
-              <a:t> Example: ruby-benchmark-suite</a:t>
+              <a:t>Language:		</a:t>
+            </a:r>
+            <a:r>
+              <a:rPr lang="en-US" dirty="0" smtClean="0">
+                <a:solidFill>
+                  <a:srgbClr xmlns:mc="http://schemas.openxmlformats.org/markup-compatibility/2006" xmlns:a14="http://schemas.microsoft.com/office/drawing/2010/main" val="00FF00" mc:Ignorable=""/>
+                </a:solidFill>
+              </a:rPr>
+              <a:t>97%</a:t>
             </a:r>
           </a:p>
           <a:p>
@@ -9797,8 +10079,12 @@
               <a:buChar char="v"/>
             </a:pPr>
             <a:r>
+              <a:rPr lang="en-US" dirty="0"/>
+              <a:t> </a:t>
+            </a:r>
+            <a:r>
               <a:rPr lang="en-US" dirty="0" smtClean="0"/>
-              <a:t> </a:t>
+              <a:t>Core:			</a:t>
             </a:r>
             <a:r>
               <a:rPr lang="en-US" dirty="0" smtClean="0">
@@ -9806,17 +10092,8 @@
                   <a:srgbClr xmlns:mc="http://schemas.openxmlformats.org/markup-compatibility/2006" xmlns:a14="http://schemas.microsoft.com/office/drawing/2010/main" val="00FF00" mc:Ignorable=""/>
                 </a:solidFill>
               </a:rPr>
-              <a:t>2x</a:t>
-            </a:r>
-            <a:r>
-              <a:rPr lang="en-US" dirty="0" smtClean="0"/>
-              <a:t> faster than MRI via </a:t>
-            </a:r>
-            <a:r>
-              <a:rPr lang="en-US" dirty="0" err="1" smtClean="0"/>
-              <a:t>RubyInstaller</a:t>
-            </a:r>
-            <a:endParaRPr lang="en-US" dirty="0" smtClean="0"/>
+              <a:t>91%</a:t>
+            </a:r>
           </a:p>
           <a:p>
             <a:pPr lvl="1">
@@ -9828,16 +10105,36 @@
               <a:t> </a:t>
             </a:r>
             <a:r>
+              <a:rPr lang="en-US" dirty="0" smtClean="0"/>
+              <a:t>Libraries:		</a:t>
+            </a:r>
+            <a:r>
               <a:rPr lang="en-US" dirty="0" smtClean="0">
                 <a:solidFill>
                   <a:srgbClr xmlns:mc="http://schemas.openxmlformats.org/markup-compatibility/2006" xmlns:a14="http://schemas.microsoft.com/office/drawing/2010/main" val="00FF00" mc:Ignorable=""/>
                 </a:solidFill>
               </a:rPr>
-              <a:t>6x</a:t>
-            </a:r>
+              <a:t>93%</a:t>
+            </a:r>
+            <a:endParaRPr lang="en-US" dirty="0">
+              <a:solidFill>
+                <a:srgbClr xmlns:mc="http://schemas.openxmlformats.org/markup-compatibility/2006" xmlns:a14="http://schemas.microsoft.com/office/drawing/2010/main" val="00FF00" mc:Ignorable=""/>
+              </a:solidFill>
+            </a:endParaRPr>
+          </a:p>
+          <a:p>
+            <a:pPr marL="57150" indent="0">
+              <a:buNone/>
+            </a:pPr>
+            <a:endParaRPr lang="en-US" dirty="0" smtClean="0"/>
+          </a:p>
+          <a:p>
+            <a:pPr marL="57150" indent="0">
+              <a:buNone/>
+            </a:pPr>
             <a:r>
               <a:rPr lang="en-US" dirty="0" smtClean="0"/>
-              <a:t> faster than MRI via One-Click Installer</a:t>
+              <a:t>Libraries</a:t>
             </a:r>
           </a:p>
           <a:p>
@@ -9850,22 +10147,21 @@
               <a:t> </a:t>
             </a:r>
             <a:r>
+              <a:rPr lang="en-US" dirty="0" err="1" smtClean="0"/>
+              <a:t>RubyGems</a:t>
+            </a:r>
+            <a:r>
+              <a:rPr lang="en-US" dirty="0" smtClean="0"/>
+              <a:t>:		</a:t>
+            </a:r>
+            <a:r>
               <a:rPr lang="en-US" dirty="0" smtClean="0">
                 <a:solidFill>
-                  <a:srgbClr xmlns:mc="http://schemas.openxmlformats.org/markup-compatibility/2006" xmlns:a14="http://schemas.microsoft.com/office/drawing/2010/main" val="FF0000" mc:Ignorable=""/>
-                </a:solidFill>
-              </a:rPr>
-              <a:t>-1.5x</a:t>
-            </a:r>
-            <a:r>
-              <a:rPr lang="en-US" dirty="0" smtClean="0"/>
-              <a:t> slower than </a:t>
-            </a:r>
-            <a:r>
-              <a:rPr lang="en-US" dirty="0" err="1" smtClean="0"/>
-              <a:t>JRuby</a:t>
-            </a:r>
-            <a:endParaRPr lang="en-US" dirty="0"/>
+                  <a:srgbClr xmlns:mc="http://schemas.openxmlformats.org/markup-compatibility/2006" xmlns:a14="http://schemas.microsoft.com/office/drawing/2010/main" val="00FF00" mc:Ignorable=""/>
+                </a:solidFill>
+              </a:rPr>
+              <a:t>96%</a:t>
+            </a:r>
           </a:p>
           <a:p>
             <a:pPr lvl="1">
@@ -9873,27 +10169,24 @@
               <a:buChar char="v"/>
             </a:pPr>
             <a:r>
+              <a:rPr lang="en-US" dirty="0"/>
+              <a:t> </a:t>
+            </a:r>
+            <a:r>
+              <a:rPr lang="en-US" dirty="0" err="1" smtClean="0"/>
+              <a:t>ActionPack</a:t>
+            </a:r>
+            <a:r>
+              <a:rPr lang="en-US" dirty="0" smtClean="0"/>
+              <a:t>:		</a:t>
+            </a:r>
+            <a:r>
               <a:rPr lang="en-US" dirty="0" smtClean="0">
                 <a:solidFill>
-                  <a:srgbClr xmlns:mc="http://schemas.openxmlformats.org/markup-compatibility/2006" xmlns:a14="http://schemas.microsoft.com/office/drawing/2010/main" val="FFFF00" mc:Ignorable=""/>
-                </a:solidFill>
-              </a:rPr>
-              <a:t> Need to improve a bit on this by 1.0</a:t>
-            </a:r>
-          </a:p>
-          <a:p>
-            <a:pPr marL="457200" lvl="1" indent="0">
-              <a:buNone/>
-            </a:pPr>
-            <a:endParaRPr lang="en-US" dirty="0" smtClean="0"/>
-          </a:p>
-          <a:p>
-            <a:pPr marL="57150" indent="0">
-              <a:buNone/>
-            </a:pPr>
-            <a:r>
-              <a:rPr lang="en-US" dirty="0" smtClean="0"/>
-              <a:t>Startup</a:t>
+                  <a:srgbClr xmlns:mc="http://schemas.openxmlformats.org/markup-compatibility/2006" xmlns:a14="http://schemas.microsoft.com/office/drawing/2010/main" val="00FF00" mc:Ignorable=""/>
+                </a:solidFill>
+              </a:rPr>
+              <a:t>95%	</a:t>
             </a:r>
           </a:p>
           <a:p>
@@ -9902,134 +10195,32 @@
               <a:buChar char="v"/>
             </a:pPr>
             <a:r>
+              <a:rPr lang="en-US" dirty="0"/>
+              <a:t> </a:t>
+            </a:r>
+            <a:r>
+              <a:rPr lang="en-US" dirty="0" err="1" smtClean="0"/>
+              <a:t>ActiveSupport</a:t>
+            </a:r>
+            <a:r>
               <a:rPr lang="en-US" dirty="0" smtClean="0"/>
-              <a:t> Example:   </a:t>
+              <a:t>:		</a:t>
             </a:r>
             <a:r>
               <a:rPr lang="en-US" dirty="0" smtClean="0">
-                <a:latin typeface="Consolas" pitchFamily="49" charset="0"/>
-                <a:cs typeface="Consolas" pitchFamily="49" charset="0"/>
-              </a:rPr>
-              <a:t>require '</a:t>
-            </a:r>
-            <a:r>
-              <a:rPr lang="en-US" dirty="0" err="1" smtClean="0">
-                <a:latin typeface="Consolas" pitchFamily="49" charset="0"/>
-                <a:cs typeface="Consolas" pitchFamily="49" charset="0"/>
-              </a:rPr>
-              <a:t>activesupport</a:t>
-            </a:r>
-            <a:r>
-              <a:rPr lang="en-US" dirty="0" smtClean="0">
-                <a:latin typeface="Consolas" pitchFamily="49" charset="0"/>
-                <a:cs typeface="Consolas" pitchFamily="49" charset="0"/>
-              </a:rPr>
-              <a:t>'</a:t>
-            </a:r>
-          </a:p>
-          <a:p>
-            <a:pPr lvl="1">
-              <a:buFont typeface="Wingdings" pitchFamily="2" charset="2"/>
-              <a:buChar char="v"/>
-            </a:pPr>
-            <a:r>
-              <a:rPr lang="en-US" dirty="0" smtClean="0"/>
-              <a:t> </a:t>
-            </a:r>
-            <a:r>
-              <a:rPr lang="en-US" dirty="0" smtClean="0">
-                <a:solidFill>
-                  <a:srgbClr xmlns:mc="http://schemas.openxmlformats.org/markup-compatibility/2006" xmlns:a14="http://schemas.microsoft.com/office/drawing/2010/main" val="FF0000" mc:Ignorable=""/>
-                </a:solidFill>
-              </a:rPr>
-              <a:t>4x</a:t>
-            </a:r>
-            <a:r>
-              <a:rPr lang="en-US" dirty="0" smtClean="0"/>
-              <a:t> slower than MRI via </a:t>
-            </a:r>
-            <a:r>
-              <a:rPr lang="en-US" dirty="0" err="1" smtClean="0"/>
-              <a:t>RubyInstaller</a:t>
-            </a:r>
-            <a:endParaRPr lang="en-US" dirty="0" smtClean="0"/>
-          </a:p>
-          <a:p>
-            <a:pPr lvl="1">
-              <a:buFont typeface="Wingdings" pitchFamily="2" charset="2"/>
-              <a:buChar char="v"/>
-            </a:pPr>
-            <a:r>
-              <a:rPr lang="en-US" dirty="0" smtClean="0"/>
-              <a:t> </a:t>
-            </a:r>
-            <a:r>
-              <a:rPr lang="en-US" dirty="0" smtClean="0">
-                <a:solidFill>
-                  <a:srgbClr xmlns:mc="http://schemas.openxmlformats.org/markup-compatibility/2006" xmlns:a14="http://schemas.microsoft.com/office/drawing/2010/main" val="FF0000" mc:Ignorable=""/>
-                </a:solidFill>
-              </a:rPr>
-              <a:t>2x</a:t>
-            </a:r>
-            <a:r>
-              <a:rPr lang="en-US" dirty="0" smtClean="0"/>
-              <a:t> slower than </a:t>
-            </a:r>
-            <a:r>
-              <a:rPr lang="en-US" dirty="0" err="1" smtClean="0"/>
-              <a:t>Jruby</a:t>
-            </a:r>
-            <a:endParaRPr lang="en-US" dirty="0" smtClean="0"/>
-          </a:p>
-          <a:p>
-            <a:pPr lvl="1">
-              <a:buFont typeface="Wingdings" pitchFamily="2" charset="2"/>
-              <a:buChar char="v"/>
-            </a:pPr>
-            <a:r>
-              <a:rPr lang="en-US" dirty="0" smtClean="0">
-                <a:solidFill>
-                  <a:srgbClr xmlns:mc="http://schemas.openxmlformats.org/markup-compatibility/2006" xmlns:a14="http://schemas.microsoft.com/office/drawing/2010/main" val="C00000" mc:Ignorable=""/>
-                </a:solidFill>
-              </a:rPr>
-              <a:t> A </a:t>
-            </a:r>
-            <a:r>
-              <a:rPr lang="en-US" u="sng" dirty="0" smtClean="0">
-                <a:solidFill>
-                  <a:srgbClr xmlns:mc="http://schemas.openxmlformats.org/markup-compatibility/2006" xmlns:a14="http://schemas.microsoft.com/office/drawing/2010/main" val="C00000" mc:Ignorable=""/>
-                </a:solidFill>
-              </a:rPr>
-              <a:t>must-fix </a:t>
-            </a:r>
-            <a:r>
-              <a:rPr lang="en-US" dirty="0" smtClean="0">
-                <a:solidFill>
-                  <a:srgbClr xmlns:mc="http://schemas.openxmlformats.org/markup-compatibility/2006" xmlns:a14="http://schemas.microsoft.com/office/drawing/2010/main" val="C00000" mc:Ignorable=""/>
-                </a:solidFill>
-              </a:rPr>
-              <a:t>for 1.0 – must be on par with </a:t>
-            </a:r>
-            <a:r>
-              <a:rPr lang="en-US" dirty="0" err="1" smtClean="0">
-                <a:solidFill>
-                  <a:srgbClr xmlns:mc="http://schemas.openxmlformats.org/markup-compatibility/2006" xmlns:a14="http://schemas.microsoft.com/office/drawing/2010/main" val="C00000" mc:Ignorable=""/>
-                </a:solidFill>
-              </a:rPr>
-              <a:t>JRuby</a:t>
-            </a:r>
-            <a:endParaRPr lang="en-US" u="sng" dirty="0" smtClean="0">
-              <a:solidFill>
-                <a:srgbClr xmlns:mc="http://schemas.openxmlformats.org/markup-compatibility/2006" xmlns:a14="http://schemas.microsoft.com/office/drawing/2010/main" val="C00000" mc:Ignorable=""/>
-              </a:solidFill>
-            </a:endParaRPr>
+                <a:solidFill>
+                  <a:srgbClr xmlns:mc="http://schemas.openxmlformats.org/markup-compatibility/2006" xmlns:a14="http://schemas.microsoft.com/office/drawing/2010/main" val="00FF00" mc:Ignorable=""/>
+                </a:solidFill>
+              </a:rPr>
+              <a:t>95%</a:t>
+            </a:r>
           </a:p>
         </p:txBody>
       </p:sp>
     </p:spTree>
     <p:extLst>
       <p:ext uri="{BB962C8B-B14F-4D97-AF65-F5344CB8AC3E}">
-        <p14:creationId xmlns:p14="http://schemas.microsoft.com/office/powerpoint/2010/main" val="2690338689"/>
+        <p14:creationId xmlns:p14="http://schemas.microsoft.com/office/powerpoint/2010/main" val="3445922722"/>
       </p:ext>
     </p:extLst>
   </p:cSld>
@@ -10081,7 +10272,7 @@
         </p:spPr>
         <p:txBody>
           <a:bodyPr anchor="ctr">
-            <a:normAutofit fontScale="85000" lnSpcReduction="20000"/>
+            <a:normAutofit/>
           </a:bodyPr>
           <a:lstStyle/>
           <a:p>
@@ -10089,8 +10280,8 @@
               <a:buNone/>
             </a:pPr>
             <a:r>
-              <a:rPr lang="en-US" sz="4300" dirty="0" smtClean="0"/>
-              <a:t>Compatibility</a:t>
+              <a:rPr lang="en-US" sz="4000" dirty="0" smtClean="0"/>
+              <a:t>CLR Integration</a:t>
             </a:r>
           </a:p>
           <a:p>
@@ -10099,29 +10290,25 @@
               <a:buChar char="v"/>
             </a:pPr>
             <a:r>
+              <a:rPr lang="en-US" sz="2600" dirty="0" smtClean="0"/>
+              <a:t> Goal: use majority of CLR features from Ruby  without needing C# stubs</a:t>
+            </a:r>
+          </a:p>
+          <a:p>
+            <a:pPr marL="57150" indent="0">
+              <a:buNone/>
+            </a:pPr>
+            <a:endParaRPr lang="en-US" sz="3000" dirty="0" smtClean="0"/>
+          </a:p>
+          <a:p>
+            <a:pPr marL="57150" indent="0">
+              <a:buNone/>
+            </a:pPr>
+            <a:r>
               <a:rPr lang="en-US" sz="3000" dirty="0" smtClean="0"/>
-              <a:t> Goal: </a:t>
-            </a:r>
-            <a:r>
-              <a:rPr lang="en-US" sz="3000" dirty="0" smtClean="0">
-                <a:solidFill>
-                  <a:srgbClr xmlns:mc="http://schemas.openxmlformats.org/markup-compatibility/2006" xmlns:a14="http://schemas.microsoft.com/office/drawing/2010/main" val="00FF00" mc:Ignorable=""/>
-                </a:solidFill>
-              </a:rPr>
-              <a:t>&gt;</a:t>
-            </a:r>
-            <a:r>
-              <a:rPr lang="en-US" sz="3000" dirty="0" smtClean="0"/>
-              <a:t> </a:t>
-            </a:r>
-            <a:r>
-              <a:rPr lang="en-US" sz="3000" dirty="0" smtClean="0">
-                <a:solidFill>
-                  <a:srgbClr xmlns:mc="http://schemas.openxmlformats.org/markup-compatibility/2006" xmlns:a14="http://schemas.microsoft.com/office/drawing/2010/main" val="00FF00" mc:Ignorable=""/>
-                </a:solidFill>
-              </a:rPr>
-              <a:t>90% passing</a:t>
-            </a:r>
+              <a:t>Only major missing feature</a:t>
+            </a:r>
+            <a:endParaRPr lang="en-US" sz="3000" dirty="0"/>
           </a:p>
           <a:p>
             <a:pPr lvl="1">
@@ -10129,58 +10316,21 @@
               <a:buChar char="v"/>
             </a:pPr>
             <a:r>
-              <a:rPr lang="en-US" sz="3000" dirty="0"/>
+              <a:rPr lang="en-US" dirty="0" smtClean="0"/>
               <a:t> </a:t>
             </a:r>
             <a:r>
-              <a:rPr lang="en-US" sz="3000" dirty="0" smtClean="0"/>
-              <a:t>Must have really good reason </a:t>
-            </a:r>
-            <a:r>
-              <a:rPr lang="en-US" sz="3000" dirty="0" err="1" smtClean="0"/>
-              <a:t>foreach</a:t>
-            </a:r>
-            <a:r>
-              <a:rPr lang="en-US" sz="3000" dirty="0" smtClean="0"/>
-              <a:t> failing </a:t>
-            </a:r>
-            <a:r>
-              <a:rPr lang="en-US" sz="3000" dirty="0" err="1" smtClean="0"/>
-              <a:t>RubySpecs</a:t>
-            </a:r>
-            <a:endParaRPr lang="en-US" sz="3000" dirty="0" smtClean="0"/>
-          </a:p>
-          <a:p>
-            <a:pPr marL="0" indent="0">
-              <a:buNone/>
-            </a:pPr>
-            <a:endParaRPr lang="en-US" dirty="0" smtClean="0"/>
-          </a:p>
-          <a:p>
-            <a:pPr marL="0" indent="0">
-              <a:buNone/>
-            </a:pPr>
-            <a:r>
-              <a:rPr lang="en-US" dirty="0" err="1" smtClean="0"/>
-              <a:t>RubySpec</a:t>
-            </a:r>
-            <a:r>
-              <a:rPr lang="en-US" dirty="0" smtClean="0"/>
-              <a:t>:			</a:t>
-            </a:r>
-            <a:r>
-              <a:rPr lang="en-US" b="1" dirty="0" smtClean="0">
-                <a:solidFill>
-                  <a:srgbClr xmlns:mc="http://schemas.openxmlformats.org/markup-compatibility/2006" xmlns:a14="http://schemas.microsoft.com/office/drawing/2010/main" val="00FF00" mc:Ignorable=""/>
-                </a:solidFill>
-              </a:rPr>
-              <a:t>92%</a:t>
-            </a:r>
-            <a:endParaRPr lang="en-US" b="1" dirty="0" smtClean="0">
-              <a:solidFill>
-                <a:srgbClr xmlns:mc="http://schemas.openxmlformats.org/markup-compatibility/2006" xmlns:a14="http://schemas.microsoft.com/office/drawing/2010/main" val="00FF00" mc:Ignorable=""/>
-              </a:solidFill>
-            </a:endParaRPr>
+              <a:rPr lang="en-US" sz="2600" dirty="0" smtClean="0"/>
+              <a:t>No support for any CLR feature which depends on a CLR type actually existing (Attributes, property data binding, </a:t>
+            </a:r>
+            <a:r>
+              <a:rPr lang="en-US" sz="2600" dirty="0" err="1" smtClean="0"/>
+              <a:t>etc</a:t>
+            </a:r>
+            <a:r>
+              <a:rPr lang="en-US" sz="2600" dirty="0" smtClean="0"/>
+              <a:t>)</a:t>
+            </a:r>
           </a:p>
           <a:p>
             <a:pPr lvl="1">
@@ -10188,199 +10338,28 @@
               <a:buChar char="v"/>
             </a:pPr>
             <a:r>
-              <a:rPr lang="en-US" dirty="0"/>
+              <a:rPr lang="en-US" sz="2600" dirty="0">
+                <a:solidFill>
+                  <a:srgbClr xmlns:mc="http://schemas.openxmlformats.org/markup-compatibility/2006" xmlns:a14="http://schemas.microsoft.com/office/drawing/2010/main" val="00FF00" mc:Ignorable=""/>
+                </a:solidFill>
+              </a:rPr>
               <a:t> </a:t>
             </a:r>
             <a:r>
-              <a:rPr lang="en-US" dirty="0" smtClean="0"/>
-              <a:t>Language:		</a:t>
-            </a:r>
-            <a:r>
-              <a:rPr lang="en-US" dirty="0" smtClean="0">
+              <a:rPr lang="en-US" sz="2600" dirty="0" smtClean="0">
                 <a:solidFill>
                   <a:srgbClr xmlns:mc="http://schemas.openxmlformats.org/markup-compatibility/2006" xmlns:a14="http://schemas.microsoft.com/office/drawing/2010/main" val="00FF00" mc:Ignorable=""/>
                 </a:solidFill>
               </a:rPr>
-              <a:t>97%</a:t>
-            </a:r>
-            <a:endParaRPr lang="en-US" dirty="0" smtClean="0">
-              <a:solidFill>
-                <a:srgbClr xmlns:mc="http://schemas.openxmlformats.org/markup-compatibility/2006" xmlns:a14="http://schemas.microsoft.com/office/drawing/2010/main" val="00FF00" mc:Ignorable=""/>
-              </a:solidFill>
-            </a:endParaRPr>
-          </a:p>
-          <a:p>
-            <a:pPr lvl="1">
-              <a:buFont typeface="Wingdings" pitchFamily="2" charset="2"/>
-              <a:buChar char="v"/>
-            </a:pPr>
-            <a:r>
-              <a:rPr lang="en-US" dirty="0"/>
-              <a:t> </a:t>
-            </a:r>
-            <a:r>
-              <a:rPr lang="en-US" dirty="0" smtClean="0"/>
-              <a:t>Core:			</a:t>
-            </a:r>
-            <a:r>
-              <a:rPr lang="en-US" dirty="0" smtClean="0">
-                <a:solidFill>
-                  <a:srgbClr xmlns:mc="http://schemas.openxmlformats.org/markup-compatibility/2006" xmlns:a14="http://schemas.microsoft.com/office/drawing/2010/main" val="00FF00" mc:Ignorable=""/>
-                </a:solidFill>
-              </a:rPr>
-              <a:t>91%</a:t>
-            </a:r>
-            <a:endParaRPr lang="en-US" dirty="0" smtClean="0">
-              <a:solidFill>
-                <a:srgbClr xmlns:mc="http://schemas.openxmlformats.org/markup-compatibility/2006" xmlns:a14="http://schemas.microsoft.com/office/drawing/2010/main" val="00FF00" mc:Ignorable=""/>
-              </a:solidFill>
-            </a:endParaRPr>
-          </a:p>
-          <a:p>
-            <a:pPr lvl="1">
-              <a:buFont typeface="Wingdings" pitchFamily="2" charset="2"/>
-              <a:buChar char="v"/>
-            </a:pPr>
-            <a:r>
-              <a:rPr lang="en-US" dirty="0"/>
-              <a:t> </a:t>
-            </a:r>
-            <a:r>
-              <a:rPr lang="en-US" dirty="0" smtClean="0"/>
-              <a:t>Libraries</a:t>
-            </a:r>
-            <a:r>
-              <a:rPr lang="en-US" dirty="0" smtClean="0"/>
-              <a:t>:		</a:t>
-            </a:r>
-            <a:r>
-              <a:rPr lang="en-US" dirty="0" smtClean="0">
-                <a:solidFill>
-                  <a:srgbClr xmlns:mc="http://schemas.openxmlformats.org/markup-compatibility/2006" xmlns:a14="http://schemas.microsoft.com/office/drawing/2010/main" val="00FF00" mc:Ignorable=""/>
-                </a:solidFill>
-              </a:rPr>
-              <a:t>93%</a:t>
-            </a:r>
-            <a:endParaRPr lang="en-US" dirty="0">
-              <a:solidFill>
-                <a:srgbClr xmlns:mc="http://schemas.openxmlformats.org/markup-compatibility/2006" xmlns:a14="http://schemas.microsoft.com/office/drawing/2010/main" val="00FF00" mc:Ignorable=""/>
-              </a:solidFill>
-            </a:endParaRPr>
-          </a:p>
-          <a:p>
-            <a:pPr marL="57150" indent="0">
-              <a:buNone/>
-            </a:pPr>
-            <a:endParaRPr lang="en-US" dirty="0" smtClean="0"/>
-          </a:p>
-          <a:p>
-            <a:pPr marL="57150" indent="0">
-              <a:buNone/>
-            </a:pPr>
-            <a:r>
-              <a:rPr lang="en-US" dirty="0" smtClean="0"/>
-              <a:t>Libraries</a:t>
-            </a:r>
-          </a:p>
-          <a:p>
-            <a:pPr lvl="1">
-              <a:buFont typeface="Wingdings" pitchFamily="2" charset="2"/>
-              <a:buChar char="v"/>
-            </a:pPr>
-            <a:r>
-              <a:rPr lang="en-US" dirty="0"/>
-              <a:t> </a:t>
-            </a:r>
-            <a:r>
-              <a:rPr lang="en-US" dirty="0" err="1" smtClean="0"/>
-              <a:t>RubyGems</a:t>
-            </a:r>
-            <a:r>
-              <a:rPr lang="en-US" dirty="0" smtClean="0"/>
-              <a:t>:		</a:t>
-            </a:r>
-            <a:r>
-              <a:rPr lang="en-US" dirty="0" smtClean="0">
-                <a:solidFill>
-                  <a:srgbClr xmlns:mc="http://schemas.openxmlformats.org/markup-compatibility/2006" xmlns:a14="http://schemas.microsoft.com/office/drawing/2010/main" val="00FF00" mc:Ignorable=""/>
-                </a:solidFill>
-              </a:rPr>
-              <a:t>96%</a:t>
-            </a:r>
-            <a:endParaRPr lang="en-US" dirty="0" smtClean="0">
-              <a:solidFill>
-                <a:srgbClr xmlns:mc="http://schemas.openxmlformats.org/markup-compatibility/2006" xmlns:a14="http://schemas.microsoft.com/office/drawing/2010/main" val="00FF00" mc:Ignorable=""/>
-              </a:solidFill>
-            </a:endParaRPr>
-          </a:p>
-          <a:p>
-            <a:pPr lvl="1">
-              <a:buFont typeface="Wingdings" pitchFamily="2" charset="2"/>
-              <a:buChar char="v"/>
-            </a:pPr>
-            <a:r>
-              <a:rPr lang="en-US" dirty="0"/>
-              <a:t> </a:t>
-            </a:r>
-            <a:r>
-              <a:rPr lang="en-US" dirty="0" err="1" smtClean="0"/>
-              <a:t>ActionPack</a:t>
-            </a:r>
-            <a:r>
-              <a:rPr lang="en-US" dirty="0" smtClean="0"/>
-              <a:t>:		</a:t>
-            </a:r>
-            <a:r>
-              <a:rPr lang="en-US" dirty="0" smtClean="0">
-                <a:solidFill>
-                  <a:srgbClr xmlns:mc="http://schemas.openxmlformats.org/markup-compatibility/2006" xmlns:a14="http://schemas.microsoft.com/office/drawing/2010/main" val="00FF00" mc:Ignorable=""/>
-                </a:solidFill>
-              </a:rPr>
-              <a:t>95%	</a:t>
-            </a:r>
-            <a:endParaRPr lang="en-US" dirty="0" smtClean="0">
-              <a:solidFill>
-                <a:srgbClr xmlns:mc="http://schemas.openxmlformats.org/markup-compatibility/2006" xmlns:a14="http://schemas.microsoft.com/office/drawing/2010/main" val="00FF00" mc:Ignorable=""/>
-              </a:solidFill>
-            </a:endParaRPr>
-          </a:p>
-          <a:p>
-            <a:pPr lvl="1">
-              <a:buFont typeface="Wingdings" pitchFamily="2" charset="2"/>
-              <a:buChar char="v"/>
-            </a:pPr>
-            <a:r>
-              <a:rPr lang="en-US" dirty="0"/>
-              <a:t> </a:t>
-            </a:r>
-            <a:r>
-              <a:rPr lang="en-US" dirty="0" err="1" smtClean="0"/>
-              <a:t>ActiveSupport</a:t>
-            </a:r>
-            <a:r>
-              <a:rPr lang="en-US" dirty="0" smtClean="0"/>
-              <a:t>:		</a:t>
-            </a:r>
-            <a:r>
-              <a:rPr lang="en-US" dirty="0" smtClean="0">
-                <a:solidFill>
-                  <a:srgbClr xmlns:mc="http://schemas.openxmlformats.org/markup-compatibility/2006" xmlns:a14="http://schemas.microsoft.com/office/drawing/2010/main" val="00FF00" mc:Ignorable=""/>
-                </a:solidFill>
-              </a:rPr>
-              <a:t>95%</a:t>
-            </a:r>
-            <a:endParaRPr lang="en-US" dirty="0" smtClean="0">
-              <a:solidFill>
-                <a:srgbClr xmlns:mc="http://schemas.openxmlformats.org/markup-compatibility/2006" xmlns:a14="http://schemas.microsoft.com/office/drawing/2010/main" val="00FF00" mc:Ignorable=""/>
-              </a:solidFill>
-            </a:endParaRPr>
+              <a:t>OK to ship 1.0 without it</a:t>
+            </a:r>
           </a:p>
         </p:txBody>
       </p:sp>
     </p:spTree>
     <p:extLst>
       <p:ext uri="{BB962C8B-B14F-4D97-AF65-F5344CB8AC3E}">
-        <p14:creationId xmlns:p14="http://schemas.microsoft.com/office/powerpoint/2010/main" val="3445922722"/>
+        <p14:creationId xmlns:p14="http://schemas.microsoft.com/office/powerpoint/2010/main" val="3116064284"/>
       </p:ext>
     </p:extLst>
   </p:cSld>
@@ -10441,7 +10420,7 @@
             </a:pPr>
             <a:r>
               <a:rPr lang="en-US" sz="4000" dirty="0" smtClean="0"/>
-              <a:t>CLR Integration</a:t>
+              <a:t>Roadmap to 1.0</a:t>
             </a:r>
           </a:p>
           <a:p>
@@ -10451,7 +10430,51 @@
             </a:pPr>
             <a:r>
               <a:rPr lang="en-US" sz="2600" dirty="0" smtClean="0"/>
-              <a:t> Goal: use majority of CLR features from Ruby  without needing C# stubs</a:t>
+              <a:t> Today: 1.0 RC1</a:t>
+            </a:r>
+          </a:p>
+          <a:p>
+            <a:pPr lvl="1">
+              <a:buFont typeface="Wingdings" pitchFamily="2" charset="2"/>
+              <a:buChar char="v"/>
+            </a:pPr>
+            <a:r>
+              <a:rPr lang="en-US" sz="2600" dirty="0"/>
+              <a:t> </a:t>
+            </a:r>
+            <a:r>
+              <a:rPr lang="en-US" sz="2600" dirty="0" smtClean="0"/>
+              <a:t>RC2, 3, </a:t>
+            </a:r>
+            <a:r>
+              <a:rPr lang="en-US" sz="2600" dirty="0" err="1" smtClean="0"/>
+              <a:t>etc</a:t>
+            </a:r>
+            <a:r>
+              <a:rPr lang="en-US" sz="2600" dirty="0" smtClean="0"/>
+              <a:t>, will come as needed</a:t>
+            </a:r>
+          </a:p>
+          <a:p>
+            <a:pPr lvl="1">
+              <a:buFont typeface="Wingdings" pitchFamily="2" charset="2"/>
+              <a:buChar char="v"/>
+            </a:pPr>
+            <a:r>
+              <a:rPr lang="en-US" sz="2600" dirty="0"/>
+              <a:t> </a:t>
+            </a:r>
+            <a:r>
+              <a:rPr lang="en-US" sz="2600" dirty="0" smtClean="0"/>
+              <a:t>RC build becomes </a:t>
+            </a:r>
+            <a:r>
+              <a:rPr lang="en-US" sz="2600" i="1" dirty="0" smtClean="0"/>
+              <a:t>final</a:t>
+            </a:r>
+            <a:r>
+              <a:rPr lang="en-US" sz="2600" dirty="0" smtClean="0"/>
+              <a:t> if no must-fix-for-RC bugs are accepted for a few weeks.</a:t>
             </a:r>
           </a:p>
           <a:p>
@@ -10466,9 +10489,8 @@
             </a:pPr>
             <a:r>
               <a:rPr lang="en-US" sz="3000" dirty="0" smtClean="0"/>
-              <a:t>Only major missing feature</a:t>
-            </a:r>
-            <a:endParaRPr lang="en-US" sz="3000" dirty="0"/>
+              <a:t>Work still left to do</a:t>
+            </a:r>
           </a:p>
           <a:p>
             <a:pPr lvl="1">
@@ -10476,21 +10498,34 @@
               <a:buChar char="v"/>
             </a:pPr>
             <a:r>
-              <a:rPr lang="en-US" dirty="0" smtClean="0"/>
-              <a:t> </a:t>
-            </a:r>
-            <a:r>
               <a:rPr lang="en-US" sz="2600" dirty="0" smtClean="0"/>
-              <a:t>No support for any CLR feature which depends on a CLR type actually existing (Attributes, property data binding, </a:t>
+              <a:t> Startup </a:t>
             </a:r>
             <a:r>
               <a:rPr lang="en-US" sz="2600" dirty="0" err="1" smtClean="0"/>
-              <a:t>etc</a:t>
+              <a:t>perf</a:t>
             </a:r>
             <a:r>
               <a:rPr lang="en-US" sz="2600" dirty="0" smtClean="0"/>
-              <a:t>)</a:t>
-            </a:r>
+              <a:t>: </a:t>
+            </a:r>
+            <a:r>
+              <a:rPr lang="en-US" sz="2600" dirty="0" smtClean="0">
+                <a:solidFill>
+                  <a:schemeClr val="bg1">
+                    <a:lumMod val="75000"/>
+                  </a:schemeClr>
+                </a:solidFill>
+              </a:rPr>
+              <a:t>largest factor in perceived slowness</a:t>
+            </a:r>
+            <a:endParaRPr lang="en-US" sz="2600" dirty="0">
+              <a:solidFill>
+                <a:schemeClr val="bg1">
+                  <a:lumMod val="75000"/>
+                </a:schemeClr>
+              </a:solidFill>
+            </a:endParaRPr>
           </a:p>
           <a:p>
             <a:pPr lvl="1">
@@ -10498,20 +10533,50 @@
               <a:buChar char="v"/>
             </a:pPr>
             <a:r>
-              <a:rPr lang="en-US" sz="2600" dirty="0">
-                <a:solidFill>
-                  <a:srgbClr xmlns:mc="http://schemas.openxmlformats.org/markup-compatibility/2006" xmlns:a14="http://schemas.microsoft.com/office/drawing/2010/main" val="00FF00" mc:Ignorable=""/>
-                </a:solidFill>
-              </a:rPr>
+              <a:rPr lang="en-US" sz="2600" dirty="0" smtClean="0"/>
+              <a:t> Throughput </a:t>
+            </a:r>
+            <a:r>
+              <a:rPr lang="en-US" sz="2600" dirty="0" err="1" smtClean="0"/>
+              <a:t>perf</a:t>
+            </a:r>
+            <a:r>
+              <a:rPr lang="en-US" sz="2600" dirty="0" smtClean="0"/>
+              <a:t>: </a:t>
+            </a:r>
+            <a:r>
+              <a:rPr lang="en-US" sz="2600" dirty="0" smtClean="0">
+                <a:solidFill>
+                  <a:schemeClr val="bg1">
+                    <a:lumMod val="75000"/>
+                  </a:schemeClr>
+                </a:solidFill>
+              </a:rPr>
+              <a:t>related to startup, but will focus on library implementations.</a:t>
+            </a:r>
+          </a:p>
+          <a:p>
+            <a:pPr lvl="1">
+              <a:buFont typeface="Wingdings" pitchFamily="2" charset="2"/>
+              <a:buChar char="v"/>
+            </a:pPr>
+            <a:r>
+              <a:rPr lang="en-US" sz="2600" dirty="0"/>
               <a:t> </a:t>
             </a:r>
             <a:r>
+              <a:rPr lang="en-US" sz="2600" dirty="0" smtClean="0"/>
+              <a:t>Bugs</a:t>
+            </a:r>
+            <a:r>
               <a:rPr lang="en-US" sz="2600" dirty="0" smtClean="0">
                 <a:solidFill>
-                  <a:srgbClr xmlns:mc="http://schemas.openxmlformats.org/markup-compatibility/2006" xmlns:a14="http://schemas.microsoft.com/office/drawing/2010/main" val="00FF00" mc:Ignorable=""/>
-                </a:solidFill>
-              </a:rPr>
-              <a:t>OK to ship 1.0 without it</a:t>
+                  <a:schemeClr val="bg1">
+                    <a:lumMod val="75000"/>
+                  </a:schemeClr>
+                </a:solidFill>
+              </a:rPr>
+              <a:t>: 50 open bugs, plus whatever bump the RC gives</a:t>
             </a:r>
           </a:p>
         </p:txBody>
@@ -10519,7 +10584,7 @@
     </p:spTree>
     <p:extLst>
       <p:ext uri="{BB962C8B-B14F-4D97-AF65-F5344CB8AC3E}">
-        <p14:creationId xmlns:p14="http://schemas.microsoft.com/office/powerpoint/2010/main" val="3116064284"/>
+        <p14:creationId xmlns:p14="http://schemas.microsoft.com/office/powerpoint/2010/main" val="4071894193"/>
       </p:ext>
     </p:extLst>
   </p:cSld>
@@ -10555,231 +10620,6 @@
       </p:grpSpPr>
       <p:sp>
         <p:nvSpPr>
-          <p:cNvPr id="3" name="Content Placeholder 2"/>
-          <p:cNvSpPr>
-            <a:spLocks noGrp="1"/>
-          </p:cNvSpPr>
-          <p:nvPr>
-            <p:ph idx="1"/>
-          </p:nvPr>
-        </p:nvSpPr>
-        <p:spPr>
-          <a:xfrm>
-            <a:off x="381000" y="419100"/>
-            <a:ext cx="8382000" cy="6019800"/>
-          </a:xfrm>
-        </p:spPr>
-        <p:txBody>
-          <a:bodyPr anchor="ctr">
-            <a:normAutofit/>
-          </a:bodyPr>
-          <a:lstStyle/>
-          <a:p>
-            <a:pPr marL="0" indent="0">
-              <a:buNone/>
-            </a:pPr>
-            <a:r>
-              <a:rPr lang="en-US" sz="4000" dirty="0" smtClean="0"/>
-              <a:t>Roadmap to 1.0</a:t>
-            </a:r>
-          </a:p>
-          <a:p>
-            <a:pPr lvl="1">
-              <a:buFont typeface="Wingdings" pitchFamily="2" charset="2"/>
-              <a:buChar char="v"/>
-            </a:pPr>
-            <a:r>
-              <a:rPr lang="en-US" sz="2600" dirty="0" smtClean="0"/>
-              <a:t> Today: 1.0 RC1</a:t>
-            </a:r>
-          </a:p>
-          <a:p>
-            <a:pPr lvl="1">
-              <a:buFont typeface="Wingdings" pitchFamily="2" charset="2"/>
-              <a:buChar char="v"/>
-            </a:pPr>
-            <a:r>
-              <a:rPr lang="en-US" sz="2600" dirty="0"/>
-              <a:t> </a:t>
-            </a:r>
-            <a:r>
-              <a:rPr lang="en-US" sz="2600" dirty="0" smtClean="0"/>
-              <a:t>RC2, 3, </a:t>
-            </a:r>
-            <a:r>
-              <a:rPr lang="en-US" sz="2600" dirty="0" err="1" smtClean="0"/>
-              <a:t>etc</a:t>
-            </a:r>
-            <a:r>
-              <a:rPr lang="en-US" sz="2600" dirty="0" smtClean="0"/>
-              <a:t>, will come as needed</a:t>
-            </a:r>
-          </a:p>
-          <a:p>
-            <a:pPr lvl="1">
-              <a:buFont typeface="Wingdings" pitchFamily="2" charset="2"/>
-              <a:buChar char="v"/>
-            </a:pPr>
-            <a:r>
-              <a:rPr lang="en-US" sz="2600" dirty="0"/>
-              <a:t> </a:t>
-            </a:r>
-            <a:r>
-              <a:rPr lang="en-US" sz="2600" dirty="0" smtClean="0"/>
-              <a:t>RC build becomes </a:t>
-            </a:r>
-            <a:r>
-              <a:rPr lang="en-US" sz="2600" i="1" dirty="0" smtClean="0"/>
-              <a:t>final</a:t>
-            </a:r>
-            <a:r>
-              <a:rPr lang="en-US" sz="2600" dirty="0" smtClean="0"/>
-              <a:t> if no must-fix-for-RC bugs are accepted for a few weeks.</a:t>
-            </a:r>
-          </a:p>
-          <a:p>
-            <a:pPr marL="57150" indent="0">
-              <a:buNone/>
-            </a:pPr>
-            <a:endParaRPr lang="en-US" sz="3000" dirty="0" smtClean="0"/>
-          </a:p>
-          <a:p>
-            <a:pPr marL="57150" indent="0">
-              <a:buNone/>
-            </a:pPr>
-            <a:r>
-              <a:rPr lang="en-US" sz="3000" dirty="0" smtClean="0"/>
-              <a:t>Work still left to do</a:t>
-            </a:r>
-          </a:p>
-          <a:p>
-            <a:pPr lvl="1">
-              <a:buFont typeface="Wingdings" pitchFamily="2" charset="2"/>
-              <a:buChar char="v"/>
-            </a:pPr>
-            <a:r>
-              <a:rPr lang="en-US" sz="2600" dirty="0" smtClean="0"/>
-              <a:t> Startup </a:t>
-            </a:r>
-            <a:r>
-              <a:rPr lang="en-US" sz="2600" dirty="0" err="1" smtClean="0"/>
-              <a:t>perf</a:t>
-            </a:r>
-            <a:r>
-              <a:rPr lang="en-US" sz="2600" dirty="0" smtClean="0"/>
-              <a:t>: </a:t>
-            </a:r>
-            <a:r>
-              <a:rPr lang="en-US" sz="2600" dirty="0" smtClean="0">
-                <a:solidFill>
-                  <a:schemeClr val="bg1">
-                    <a:lumMod val="75000"/>
-                  </a:schemeClr>
-                </a:solidFill>
-              </a:rPr>
-              <a:t>largest factor in perceived slowness</a:t>
-            </a:r>
-            <a:endParaRPr lang="en-US" sz="2600" dirty="0">
-              <a:solidFill>
-                <a:schemeClr val="bg1">
-                  <a:lumMod val="75000"/>
-                </a:schemeClr>
-              </a:solidFill>
-            </a:endParaRPr>
-          </a:p>
-          <a:p>
-            <a:pPr lvl="1">
-              <a:buFont typeface="Wingdings" pitchFamily="2" charset="2"/>
-              <a:buChar char="v"/>
-            </a:pPr>
-            <a:r>
-              <a:rPr lang="en-US" sz="2600" dirty="0" smtClean="0"/>
-              <a:t> Throughput </a:t>
-            </a:r>
-            <a:r>
-              <a:rPr lang="en-US" sz="2600" dirty="0" err="1" smtClean="0"/>
-              <a:t>perf</a:t>
-            </a:r>
-            <a:r>
-              <a:rPr lang="en-US" sz="2600" dirty="0" smtClean="0"/>
-              <a:t>: </a:t>
-            </a:r>
-            <a:r>
-              <a:rPr lang="en-US" sz="2600" dirty="0" smtClean="0">
-                <a:solidFill>
-                  <a:schemeClr val="bg1">
-                    <a:lumMod val="75000"/>
-                  </a:schemeClr>
-                </a:solidFill>
-              </a:rPr>
-              <a:t>related to startup, but will focus on library implementations.</a:t>
-            </a:r>
-          </a:p>
-          <a:p>
-            <a:pPr lvl="1">
-              <a:buFont typeface="Wingdings" pitchFamily="2" charset="2"/>
-              <a:buChar char="v"/>
-            </a:pPr>
-            <a:r>
-              <a:rPr lang="en-US" sz="2600" dirty="0"/>
-              <a:t> </a:t>
-            </a:r>
-            <a:r>
-              <a:rPr lang="en-US" sz="2600" dirty="0" smtClean="0"/>
-              <a:t>Bugs</a:t>
-            </a:r>
-            <a:r>
-              <a:rPr lang="en-US" sz="2600" dirty="0" smtClean="0">
-                <a:solidFill>
-                  <a:schemeClr val="bg1">
-                    <a:lumMod val="75000"/>
-                  </a:schemeClr>
-                </a:solidFill>
-              </a:rPr>
-              <a:t>: 50 open bugs, plus whatever bump the RC gives</a:t>
-            </a:r>
-          </a:p>
-        </p:txBody>
-      </p:sp>
-    </p:spTree>
-    <p:extLst>
-      <p:ext uri="{BB962C8B-B14F-4D97-AF65-F5344CB8AC3E}">
-        <p14:creationId xmlns:p14="http://schemas.microsoft.com/office/powerpoint/2010/main" val="4071894193"/>
-      </p:ext>
-    </p:extLst>
-  </p:cSld>
-  <p:clrMapOvr>
-    <a:masterClrMapping/>
-  </p:clrMapOvr>
-  <p:timing>
-    <p:tnLst>
-      <p:par>
-        <p:cTn xmlns:p14="http://schemas.microsoft.com/office/powerpoint/2010/main" id="1" dur="indefinite" restart="never" nodeType="tmRoot"/>
-      </p:par>
-    </p:tnLst>
-  </p:timing>
-</p:sld>
-</file>
-
-<file path=ppt/slides/slide26.xml><?xml version="1.0" encoding="utf-8"?>
-<p:sld xmlns:a="http://schemas.openxmlformats.org/drawingml/2006/main" xmlns:r="http://schemas.openxmlformats.org/officeDocument/2006/relationships" xmlns:p="http://schemas.openxmlformats.org/presentationml/2006/main">
-  <p:cSld>
-    <p:spTree>
-      <p:nvGrpSpPr>
-        <p:cNvPr id="1" name=""/>
-        <p:cNvGrpSpPr/>
-        <p:nvPr/>
-      </p:nvGrpSpPr>
-      <p:grpSpPr>
-        <a:xfrm>
-          <a:off x="0" y="0"/>
-          <a:ext cx="0" cy="0"/>
-          <a:chOff x="0" y="0"/>
-          <a:chExt cx="0" cy="0"/>
-        </a:xfrm>
-      </p:grpSpPr>
-      <p:sp>
-        <p:nvSpPr>
           <p:cNvPr id="2" name="Title 1"/>
           <p:cNvSpPr>
             <a:spLocks noGrp="1"/>
@@ -10889,7 +10729,7 @@
 </p:sld>
 </file>
 
-<file path=ppt/slides/slide27.xml><?xml version="1.0" encoding="utf-8"?>
+<file path=ppt/slides/slide26.xml><?xml version="1.0" encoding="utf-8"?>
 <p:sld xmlns:a="http://schemas.openxmlformats.org/drawingml/2006/main" xmlns:r="http://schemas.openxmlformats.org/officeDocument/2006/relationships" xmlns:p="http://schemas.openxmlformats.org/presentationml/2006/main">
   <p:cSld>
     <p:spTree>
@@ -10990,7 +10830,7 @@
 </p:sld>
 </file>
 
-<file path=ppt/slides/slide28.xml><?xml version="1.0" encoding="utf-8"?>
+<file path=ppt/slides/slide27.xml><?xml version="1.0" encoding="utf-8"?>
 <p:sld xmlns:a="http://schemas.openxmlformats.org/drawingml/2006/main" xmlns:r="http://schemas.openxmlformats.org/officeDocument/2006/relationships" xmlns:p="http://schemas.openxmlformats.org/presentationml/2006/main">
   <p:cSld>
     <p:spTree>
@@ -11542,7 +11382,7 @@
 </p:sld>
 </file>
 
-<file path=ppt/slides/slide29.xml><?xml version="1.0" encoding="utf-8"?>
+<file path=ppt/slides/slide28.xml><?xml version="1.0" encoding="utf-8"?>
 <p:sld xmlns:a="http://schemas.openxmlformats.org/drawingml/2006/main" xmlns:r="http://schemas.openxmlformats.org/officeDocument/2006/relationships" xmlns:p="http://schemas.openxmlformats.org/presentationml/2006/main">
   <p:cSld>
     <p:spTree>
@@ -12973,23 +12813,7 @@
             </a:pPr>
             <a:r>
               <a:rPr lang="en-US" dirty="0" smtClean="0"/>
-              <a:t>A p</a:t>
-            </a:r>
-            <a:r>
-              <a:rPr lang="en-US" dirty="0" smtClean="0"/>
-              <a:t>remiere </a:t>
-            </a:r>
-            <a:r>
-              <a:rPr lang="en-US" dirty="0" smtClean="0"/>
-              <a:t>implementation</a:t>
-            </a:r>
-            <a:r>
-              <a:rPr lang="en-US" dirty="0" smtClean="0"/>
-              <a:t> </a:t>
-            </a:r>
-            <a:r>
-              <a:rPr lang="en-US" dirty="0" smtClean="0"/>
-              <a:t>for Windows</a:t>
+              <a:t>A premiere implementation for Windows</a:t>
             </a:r>
           </a:p>
           <a:p>
@@ -13035,17 +12859,7 @@
                   </a:schemeClr>
                 </a:solidFill>
               </a:rPr>
-              <a:t>Systems </a:t>
-            </a:r>
-            <a:r>
-              <a:rPr lang="en-US" dirty="0" smtClean="0">
-                <a:solidFill>
-                  <a:schemeClr val="bg1">
-                    <a:lumMod val="75000"/>
-                  </a:schemeClr>
-                </a:solidFill>
-              </a:rPr>
-              <a:t>management</a:t>
+              <a:t>Systems management</a:t>
             </a:r>
           </a:p>
           <a:p>

</xml_diff>